<commit_message>
Add listen film events
</commit_message>
<xml_diff>
--- a/info/Diagrama de flujo.pptx
+++ b/info/Diagrama de flujo.pptx
@@ -2,13 +2,12 @@
 <file path=ppt/presentation.xml><?xml version="1.0" encoding="utf-8"?>
 <p:presentation xmlns:a="http://schemas.openxmlformats.org/drawingml/2006/main" xmlns:r="http://schemas.openxmlformats.org/officeDocument/2006/relationships" xmlns:p="http://schemas.openxmlformats.org/presentationml/2006/main" saveSubsetFonts="1">
   <p:sldMasterIdLst>
-    <p:sldMasterId id="2147483660" r:id="rId1"/>
+    <p:sldMasterId id="2147483672" r:id="rId1"/>
   </p:sldMasterIdLst>
   <p:sldIdLst>
-    <p:sldId id="257" r:id="rId2"/>
-    <p:sldId id="256" r:id="rId3"/>
+    <p:sldId id="256" r:id="rId2"/>
   </p:sldIdLst>
-  <p:sldSz cx="6858000" cy="12192000"/>
+  <p:sldSz cx="12192000" cy="6858000"/>
   <p:notesSz cx="6858000" cy="9144000"/>
   <p:defaultTextStyle>
     <a:defPPr>
@@ -142,15 +141,15 @@
         </p:nvSpPr>
         <p:spPr>
           <a:xfrm>
-            <a:off x="514350" y="1995312"/>
-            <a:ext cx="5829300" cy="4244622"/>
+            <a:off x="1524000" y="1122363"/>
+            <a:ext cx="9144000" cy="2387600"/>
           </a:xfrm>
         </p:spPr>
         <p:txBody>
           <a:bodyPr anchor="b"/>
           <a:lstStyle>
             <a:lvl1pPr algn="ctr">
-              <a:defRPr sz="4500"/>
+              <a:defRPr sz="6000"/>
             </a:lvl1pPr>
           </a:lstStyle>
           <a:p>
@@ -174,8 +173,8 @@
         </p:nvSpPr>
         <p:spPr>
           <a:xfrm>
-            <a:off x="857250" y="6403623"/>
-            <a:ext cx="5143500" cy="2943577"/>
+            <a:off x="1524000" y="3602038"/>
+            <a:ext cx="9144000" cy="1655762"/>
           </a:xfrm>
         </p:spPr>
         <p:txBody>
@@ -183,39 +182,39 @@
           <a:lstStyle>
             <a:lvl1pPr marL="0" indent="0" algn="ctr">
               <a:buNone/>
+              <a:defRPr sz="2400"/>
+            </a:lvl1pPr>
+            <a:lvl2pPr marL="457200" indent="0" algn="ctr">
+              <a:buNone/>
+              <a:defRPr sz="2000"/>
+            </a:lvl2pPr>
+            <a:lvl3pPr marL="914400" indent="0" algn="ctr">
+              <a:buNone/>
               <a:defRPr sz="1800"/>
-            </a:lvl1pPr>
-            <a:lvl2pPr marL="342900" indent="0" algn="ctr">
-              <a:buNone/>
-              <a:defRPr sz="1500"/>
-            </a:lvl2pPr>
-            <a:lvl3pPr marL="685800" indent="0" algn="ctr">
-              <a:buNone/>
-              <a:defRPr sz="1350"/>
             </a:lvl3pPr>
-            <a:lvl4pPr marL="1028700" indent="0" algn="ctr">
-              <a:buNone/>
-              <a:defRPr sz="1200"/>
+            <a:lvl4pPr marL="1371600" indent="0" algn="ctr">
+              <a:buNone/>
+              <a:defRPr sz="1600"/>
             </a:lvl4pPr>
-            <a:lvl5pPr marL="1371600" indent="0" algn="ctr">
-              <a:buNone/>
-              <a:defRPr sz="1200"/>
+            <a:lvl5pPr marL="1828800" indent="0" algn="ctr">
+              <a:buNone/>
+              <a:defRPr sz="1600"/>
             </a:lvl5pPr>
-            <a:lvl6pPr marL="1714500" indent="0" algn="ctr">
-              <a:buNone/>
-              <a:defRPr sz="1200"/>
+            <a:lvl6pPr marL="2286000" indent="0" algn="ctr">
+              <a:buNone/>
+              <a:defRPr sz="1600"/>
             </a:lvl6pPr>
-            <a:lvl7pPr marL="2057400" indent="0" algn="ctr">
-              <a:buNone/>
-              <a:defRPr sz="1200"/>
+            <a:lvl7pPr marL="2743200" indent="0" algn="ctr">
+              <a:buNone/>
+              <a:defRPr sz="1600"/>
             </a:lvl7pPr>
-            <a:lvl8pPr marL="2400300" indent="0" algn="ctr">
-              <a:buNone/>
-              <a:defRPr sz="1200"/>
+            <a:lvl8pPr marL="3200400" indent="0" algn="ctr">
+              <a:buNone/>
+              <a:defRPr sz="1600"/>
             </a:lvl8pPr>
-            <a:lvl9pPr marL="2743200" indent="0" algn="ctr">
-              <a:buNone/>
-              <a:defRPr sz="1200"/>
+            <a:lvl9pPr marL="3657600" indent="0" algn="ctr">
+              <a:buNone/>
+              <a:defRPr sz="1600"/>
             </a:lvl9pPr>
           </a:lstStyle>
           <a:p>
@@ -244,7 +243,7 @@
           <a:p>
             <a:fld id="{97DAD922-42D4-406C-9C0D-B091530F4F9B}" type="datetimeFigureOut">
               <a:rPr lang="es-ES" smtClean="0"/>
-              <a:t>06/02/2021</a:t>
+              <a:t>09/02/2021</a:t>
             </a:fld>
             <a:endParaRPr lang="es-ES"/>
           </a:p>
@@ -295,7 +294,7 @@
     </p:spTree>
     <p:extLst>
       <p:ext uri="{BB962C8B-B14F-4D97-AF65-F5344CB8AC3E}">
-        <p14:creationId xmlns:p14="http://schemas.microsoft.com/office/powerpoint/2010/main" val="3768174346"/>
+        <p14:creationId xmlns:p14="http://schemas.microsoft.com/office/powerpoint/2010/main" val="1642577534"/>
       </p:ext>
     </p:extLst>
   </p:cSld>
@@ -414,7 +413,7 @@
           <a:p>
             <a:fld id="{97DAD922-42D4-406C-9C0D-B091530F4F9B}" type="datetimeFigureOut">
               <a:rPr lang="es-ES" smtClean="0"/>
-              <a:t>06/02/2021</a:t>
+              <a:t>09/02/2021</a:t>
             </a:fld>
             <a:endParaRPr lang="es-ES"/>
           </a:p>
@@ -465,7 +464,7 @@
     </p:spTree>
     <p:extLst>
       <p:ext uri="{BB962C8B-B14F-4D97-AF65-F5344CB8AC3E}">
-        <p14:creationId xmlns:p14="http://schemas.microsoft.com/office/powerpoint/2010/main" val="1644286170"/>
+        <p14:creationId xmlns:p14="http://schemas.microsoft.com/office/powerpoint/2010/main" val="2612492117"/>
       </p:ext>
     </p:extLst>
   </p:cSld>
@@ -504,8 +503,8 @@
         </p:nvSpPr>
         <p:spPr>
           <a:xfrm>
-            <a:off x="4907757" y="649111"/>
-            <a:ext cx="1478756" cy="10332156"/>
+            <a:off x="8724900" y="365125"/>
+            <a:ext cx="2628900" cy="5811838"/>
           </a:xfrm>
         </p:spPr>
         <p:txBody>
@@ -532,8 +531,8 @@
         </p:nvSpPr>
         <p:spPr>
           <a:xfrm>
-            <a:off x="471488" y="649111"/>
-            <a:ext cx="4350544" cy="10332156"/>
+            <a:off x="838200" y="365125"/>
+            <a:ext cx="7734300" cy="5811838"/>
           </a:xfrm>
         </p:spPr>
         <p:txBody>
@@ -594,7 +593,7 @@
           <a:p>
             <a:fld id="{97DAD922-42D4-406C-9C0D-B091530F4F9B}" type="datetimeFigureOut">
               <a:rPr lang="es-ES" smtClean="0"/>
-              <a:t>06/02/2021</a:t>
+              <a:t>09/02/2021</a:t>
             </a:fld>
             <a:endParaRPr lang="es-ES"/>
           </a:p>
@@ -645,7 +644,7 @@
     </p:spTree>
     <p:extLst>
       <p:ext uri="{BB962C8B-B14F-4D97-AF65-F5344CB8AC3E}">
-        <p14:creationId xmlns:p14="http://schemas.microsoft.com/office/powerpoint/2010/main" val="2164211732"/>
+        <p14:creationId xmlns:p14="http://schemas.microsoft.com/office/powerpoint/2010/main" val="3595465622"/>
       </p:ext>
     </p:extLst>
   </p:cSld>
@@ -764,7 +763,7 @@
           <a:p>
             <a:fld id="{97DAD922-42D4-406C-9C0D-B091530F4F9B}" type="datetimeFigureOut">
               <a:rPr lang="es-ES" smtClean="0"/>
-              <a:t>06/02/2021</a:t>
+              <a:t>09/02/2021</a:t>
             </a:fld>
             <a:endParaRPr lang="es-ES"/>
           </a:p>
@@ -815,7 +814,7 @@
     </p:spTree>
     <p:extLst>
       <p:ext uri="{BB962C8B-B14F-4D97-AF65-F5344CB8AC3E}">
-        <p14:creationId xmlns:p14="http://schemas.microsoft.com/office/powerpoint/2010/main" val="1854794147"/>
+        <p14:creationId xmlns:p14="http://schemas.microsoft.com/office/powerpoint/2010/main" val="3833040549"/>
       </p:ext>
     </p:extLst>
   </p:cSld>
@@ -854,15 +853,15 @@
         </p:nvSpPr>
         <p:spPr>
           <a:xfrm>
-            <a:off x="467916" y="3039537"/>
-            <a:ext cx="5915025" cy="5071532"/>
+            <a:off x="831850" y="1709738"/>
+            <a:ext cx="10515600" cy="2852737"/>
           </a:xfrm>
         </p:spPr>
         <p:txBody>
           <a:bodyPr anchor="b"/>
           <a:lstStyle>
             <a:lvl1pPr>
-              <a:defRPr sz="4500"/>
+              <a:defRPr sz="6000"/>
             </a:lvl1pPr>
           </a:lstStyle>
           <a:p>
@@ -886,8 +885,8 @@
         </p:nvSpPr>
         <p:spPr>
           <a:xfrm>
-            <a:off x="467916" y="8159048"/>
-            <a:ext cx="5915025" cy="2666999"/>
+            <a:off x="831850" y="4589463"/>
+            <a:ext cx="10515600" cy="1500187"/>
           </a:xfrm>
         </p:spPr>
         <p:txBody>
@@ -895,15 +894,17 @@
           <a:lstStyle>
             <a:lvl1pPr marL="0" indent="0">
               <a:buNone/>
-              <a:defRPr sz="1800">
+              <a:defRPr sz="2400">
                 <a:solidFill>
-                  <a:schemeClr val="tx1"/>
+                  <a:schemeClr val="tx1">
+                    <a:tint val="75000"/>
+                  </a:schemeClr>
                 </a:solidFill>
               </a:defRPr>
             </a:lvl1pPr>
-            <a:lvl2pPr marL="342900" indent="0">
-              <a:buNone/>
-              <a:defRPr sz="1500">
+            <a:lvl2pPr marL="457200" indent="0">
+              <a:buNone/>
+              <a:defRPr sz="2000">
                 <a:solidFill>
                   <a:schemeClr val="tx1">
                     <a:tint val="75000"/>
@@ -911,9 +912,9 @@
                 </a:solidFill>
               </a:defRPr>
             </a:lvl2pPr>
-            <a:lvl3pPr marL="685800" indent="0">
-              <a:buNone/>
-              <a:defRPr sz="1350">
+            <a:lvl3pPr marL="914400" indent="0">
+              <a:buNone/>
+              <a:defRPr sz="1800">
                 <a:solidFill>
                   <a:schemeClr val="tx1">
                     <a:tint val="75000"/>
@@ -921,9 +922,9 @@
                 </a:solidFill>
               </a:defRPr>
             </a:lvl3pPr>
-            <a:lvl4pPr marL="1028700" indent="0">
-              <a:buNone/>
-              <a:defRPr sz="1200">
+            <a:lvl4pPr marL="1371600" indent="0">
+              <a:buNone/>
+              <a:defRPr sz="1600">
                 <a:solidFill>
                   <a:schemeClr val="tx1">
                     <a:tint val="75000"/>
@@ -931,9 +932,9 @@
                 </a:solidFill>
               </a:defRPr>
             </a:lvl4pPr>
-            <a:lvl5pPr marL="1371600" indent="0">
-              <a:buNone/>
-              <a:defRPr sz="1200">
+            <a:lvl5pPr marL="1828800" indent="0">
+              <a:buNone/>
+              <a:defRPr sz="1600">
                 <a:solidFill>
                   <a:schemeClr val="tx1">
                     <a:tint val="75000"/>
@@ -941,9 +942,9 @@
                 </a:solidFill>
               </a:defRPr>
             </a:lvl5pPr>
-            <a:lvl6pPr marL="1714500" indent="0">
-              <a:buNone/>
-              <a:defRPr sz="1200">
+            <a:lvl6pPr marL="2286000" indent="0">
+              <a:buNone/>
+              <a:defRPr sz="1600">
                 <a:solidFill>
                   <a:schemeClr val="tx1">
                     <a:tint val="75000"/>
@@ -951,9 +952,9 @@
                 </a:solidFill>
               </a:defRPr>
             </a:lvl6pPr>
-            <a:lvl7pPr marL="2057400" indent="0">
-              <a:buNone/>
-              <a:defRPr sz="1200">
+            <a:lvl7pPr marL="2743200" indent="0">
+              <a:buNone/>
+              <a:defRPr sz="1600">
                 <a:solidFill>
                   <a:schemeClr val="tx1">
                     <a:tint val="75000"/>
@@ -961,9 +962,9 @@
                 </a:solidFill>
               </a:defRPr>
             </a:lvl7pPr>
-            <a:lvl8pPr marL="2400300" indent="0">
-              <a:buNone/>
-              <a:defRPr sz="1200">
+            <a:lvl8pPr marL="3200400" indent="0">
+              <a:buNone/>
+              <a:defRPr sz="1600">
                 <a:solidFill>
                   <a:schemeClr val="tx1">
                     <a:tint val="75000"/>
@@ -971,9 +972,9 @@
                 </a:solidFill>
               </a:defRPr>
             </a:lvl8pPr>
-            <a:lvl9pPr marL="2743200" indent="0">
-              <a:buNone/>
-              <a:defRPr sz="1200">
+            <a:lvl9pPr marL="3657600" indent="0">
+              <a:buNone/>
+              <a:defRPr sz="1600">
                 <a:solidFill>
                   <a:schemeClr val="tx1">
                     <a:tint val="75000"/>
@@ -1008,7 +1009,7 @@
           <a:p>
             <a:fld id="{97DAD922-42D4-406C-9C0D-B091530F4F9B}" type="datetimeFigureOut">
               <a:rPr lang="es-ES" smtClean="0"/>
-              <a:t>06/02/2021</a:t>
+              <a:t>09/02/2021</a:t>
             </a:fld>
             <a:endParaRPr lang="es-ES"/>
           </a:p>
@@ -1059,7 +1060,7 @@
     </p:spTree>
     <p:extLst>
       <p:ext uri="{BB962C8B-B14F-4D97-AF65-F5344CB8AC3E}">
-        <p14:creationId xmlns:p14="http://schemas.microsoft.com/office/powerpoint/2010/main" val="874397697"/>
+        <p14:creationId xmlns:p14="http://schemas.microsoft.com/office/powerpoint/2010/main" val="2691064914"/>
       </p:ext>
     </p:extLst>
   </p:cSld>
@@ -1121,8 +1122,8 @@
         </p:nvSpPr>
         <p:spPr>
           <a:xfrm>
-            <a:off x="471488" y="3245556"/>
-            <a:ext cx="2914650" cy="7735712"/>
+            <a:off x="838200" y="1825625"/>
+            <a:ext cx="5181600" cy="4351338"/>
           </a:xfrm>
         </p:spPr>
         <p:txBody>
@@ -1178,8 +1179,8 @@
         </p:nvSpPr>
         <p:spPr>
           <a:xfrm>
-            <a:off x="3471863" y="3245556"/>
-            <a:ext cx="2914650" cy="7735712"/>
+            <a:off x="6172200" y="1825625"/>
+            <a:ext cx="5181600" cy="4351338"/>
           </a:xfrm>
         </p:spPr>
         <p:txBody>
@@ -1240,7 +1241,7 @@
           <a:p>
             <a:fld id="{97DAD922-42D4-406C-9C0D-B091530F4F9B}" type="datetimeFigureOut">
               <a:rPr lang="es-ES" smtClean="0"/>
-              <a:t>06/02/2021</a:t>
+              <a:t>09/02/2021</a:t>
             </a:fld>
             <a:endParaRPr lang="es-ES"/>
           </a:p>
@@ -1291,7 +1292,7 @@
     </p:spTree>
     <p:extLst>
       <p:ext uri="{BB962C8B-B14F-4D97-AF65-F5344CB8AC3E}">
-        <p14:creationId xmlns:p14="http://schemas.microsoft.com/office/powerpoint/2010/main" val="2865042303"/>
+        <p14:creationId xmlns:p14="http://schemas.microsoft.com/office/powerpoint/2010/main" val="2471240245"/>
       </p:ext>
     </p:extLst>
   </p:cSld>
@@ -1330,8 +1331,8 @@
         </p:nvSpPr>
         <p:spPr>
           <a:xfrm>
-            <a:off x="472381" y="649114"/>
-            <a:ext cx="5915025" cy="2356556"/>
+            <a:off x="839788" y="365125"/>
+            <a:ext cx="10515600" cy="1325563"/>
           </a:xfrm>
         </p:spPr>
         <p:txBody>
@@ -1358,8 +1359,8 @@
         </p:nvSpPr>
         <p:spPr>
           <a:xfrm>
-            <a:off x="472381" y="2988734"/>
-            <a:ext cx="2901255" cy="1464732"/>
+            <a:off x="839788" y="1681163"/>
+            <a:ext cx="5157787" cy="823912"/>
           </a:xfrm>
         </p:spPr>
         <p:txBody>
@@ -1367,39 +1368,39 @@
           <a:lstStyle>
             <a:lvl1pPr marL="0" indent="0">
               <a:buNone/>
+              <a:defRPr sz="2400" b="1"/>
+            </a:lvl1pPr>
+            <a:lvl2pPr marL="457200" indent="0">
+              <a:buNone/>
+              <a:defRPr sz="2000" b="1"/>
+            </a:lvl2pPr>
+            <a:lvl3pPr marL="914400" indent="0">
+              <a:buNone/>
               <a:defRPr sz="1800" b="1"/>
-            </a:lvl1pPr>
-            <a:lvl2pPr marL="342900" indent="0">
-              <a:buNone/>
-              <a:defRPr sz="1500" b="1"/>
-            </a:lvl2pPr>
-            <a:lvl3pPr marL="685800" indent="0">
-              <a:buNone/>
-              <a:defRPr sz="1350" b="1"/>
             </a:lvl3pPr>
-            <a:lvl4pPr marL="1028700" indent="0">
-              <a:buNone/>
-              <a:defRPr sz="1200" b="1"/>
+            <a:lvl4pPr marL="1371600" indent="0">
+              <a:buNone/>
+              <a:defRPr sz="1600" b="1"/>
             </a:lvl4pPr>
-            <a:lvl5pPr marL="1371600" indent="0">
-              <a:buNone/>
-              <a:defRPr sz="1200" b="1"/>
+            <a:lvl5pPr marL="1828800" indent="0">
+              <a:buNone/>
+              <a:defRPr sz="1600" b="1"/>
             </a:lvl5pPr>
-            <a:lvl6pPr marL="1714500" indent="0">
-              <a:buNone/>
-              <a:defRPr sz="1200" b="1"/>
+            <a:lvl6pPr marL="2286000" indent="0">
+              <a:buNone/>
+              <a:defRPr sz="1600" b="1"/>
             </a:lvl6pPr>
-            <a:lvl7pPr marL="2057400" indent="0">
-              <a:buNone/>
-              <a:defRPr sz="1200" b="1"/>
+            <a:lvl7pPr marL="2743200" indent="0">
+              <a:buNone/>
+              <a:defRPr sz="1600" b="1"/>
             </a:lvl7pPr>
-            <a:lvl8pPr marL="2400300" indent="0">
-              <a:buNone/>
-              <a:defRPr sz="1200" b="1"/>
+            <a:lvl8pPr marL="3200400" indent="0">
+              <a:buNone/>
+              <a:defRPr sz="1600" b="1"/>
             </a:lvl8pPr>
-            <a:lvl9pPr marL="2743200" indent="0">
-              <a:buNone/>
-              <a:defRPr sz="1200" b="1"/>
+            <a:lvl9pPr marL="3657600" indent="0">
+              <a:buNone/>
+              <a:defRPr sz="1600" b="1"/>
             </a:lvl9pPr>
           </a:lstStyle>
           <a:p>
@@ -1423,8 +1424,8 @@
         </p:nvSpPr>
         <p:spPr>
           <a:xfrm>
-            <a:off x="472381" y="4453467"/>
-            <a:ext cx="2901255" cy="6550379"/>
+            <a:off x="839788" y="2505075"/>
+            <a:ext cx="5157787" cy="3684588"/>
           </a:xfrm>
         </p:spPr>
         <p:txBody>
@@ -1480,8 +1481,8 @@
         </p:nvSpPr>
         <p:spPr>
           <a:xfrm>
-            <a:off x="3471863" y="2988734"/>
-            <a:ext cx="2915543" cy="1464732"/>
+            <a:off x="6172200" y="1681163"/>
+            <a:ext cx="5183188" cy="823912"/>
           </a:xfrm>
         </p:spPr>
         <p:txBody>
@@ -1489,39 +1490,39 @@
           <a:lstStyle>
             <a:lvl1pPr marL="0" indent="0">
               <a:buNone/>
+              <a:defRPr sz="2400" b="1"/>
+            </a:lvl1pPr>
+            <a:lvl2pPr marL="457200" indent="0">
+              <a:buNone/>
+              <a:defRPr sz="2000" b="1"/>
+            </a:lvl2pPr>
+            <a:lvl3pPr marL="914400" indent="0">
+              <a:buNone/>
               <a:defRPr sz="1800" b="1"/>
-            </a:lvl1pPr>
-            <a:lvl2pPr marL="342900" indent="0">
-              <a:buNone/>
-              <a:defRPr sz="1500" b="1"/>
-            </a:lvl2pPr>
-            <a:lvl3pPr marL="685800" indent="0">
-              <a:buNone/>
-              <a:defRPr sz="1350" b="1"/>
             </a:lvl3pPr>
-            <a:lvl4pPr marL="1028700" indent="0">
-              <a:buNone/>
-              <a:defRPr sz="1200" b="1"/>
+            <a:lvl4pPr marL="1371600" indent="0">
+              <a:buNone/>
+              <a:defRPr sz="1600" b="1"/>
             </a:lvl4pPr>
-            <a:lvl5pPr marL="1371600" indent="0">
-              <a:buNone/>
-              <a:defRPr sz="1200" b="1"/>
+            <a:lvl5pPr marL="1828800" indent="0">
+              <a:buNone/>
+              <a:defRPr sz="1600" b="1"/>
             </a:lvl5pPr>
-            <a:lvl6pPr marL="1714500" indent="0">
-              <a:buNone/>
-              <a:defRPr sz="1200" b="1"/>
+            <a:lvl6pPr marL="2286000" indent="0">
+              <a:buNone/>
+              <a:defRPr sz="1600" b="1"/>
             </a:lvl6pPr>
-            <a:lvl7pPr marL="2057400" indent="0">
-              <a:buNone/>
-              <a:defRPr sz="1200" b="1"/>
+            <a:lvl7pPr marL="2743200" indent="0">
+              <a:buNone/>
+              <a:defRPr sz="1600" b="1"/>
             </a:lvl7pPr>
-            <a:lvl8pPr marL="2400300" indent="0">
-              <a:buNone/>
-              <a:defRPr sz="1200" b="1"/>
+            <a:lvl8pPr marL="3200400" indent="0">
+              <a:buNone/>
+              <a:defRPr sz="1600" b="1"/>
             </a:lvl8pPr>
-            <a:lvl9pPr marL="2743200" indent="0">
-              <a:buNone/>
-              <a:defRPr sz="1200" b="1"/>
+            <a:lvl9pPr marL="3657600" indent="0">
+              <a:buNone/>
+              <a:defRPr sz="1600" b="1"/>
             </a:lvl9pPr>
           </a:lstStyle>
           <a:p>
@@ -1545,8 +1546,8 @@
         </p:nvSpPr>
         <p:spPr>
           <a:xfrm>
-            <a:off x="3471863" y="4453467"/>
-            <a:ext cx="2915543" cy="6550379"/>
+            <a:off x="6172200" y="2505075"/>
+            <a:ext cx="5183188" cy="3684588"/>
           </a:xfrm>
         </p:spPr>
         <p:txBody>
@@ -1607,7 +1608,7 @@
           <a:p>
             <a:fld id="{97DAD922-42D4-406C-9C0D-B091530F4F9B}" type="datetimeFigureOut">
               <a:rPr lang="es-ES" smtClean="0"/>
-              <a:t>06/02/2021</a:t>
+              <a:t>09/02/2021</a:t>
             </a:fld>
             <a:endParaRPr lang="es-ES"/>
           </a:p>
@@ -1658,7 +1659,7 @@
     </p:spTree>
     <p:extLst>
       <p:ext uri="{BB962C8B-B14F-4D97-AF65-F5344CB8AC3E}">
-        <p14:creationId xmlns:p14="http://schemas.microsoft.com/office/powerpoint/2010/main" val="4203825084"/>
+        <p14:creationId xmlns:p14="http://schemas.microsoft.com/office/powerpoint/2010/main" val="2883384009"/>
       </p:ext>
     </p:extLst>
   </p:cSld>
@@ -1725,7 +1726,7 @@
           <a:p>
             <a:fld id="{97DAD922-42D4-406C-9C0D-B091530F4F9B}" type="datetimeFigureOut">
               <a:rPr lang="es-ES" smtClean="0"/>
-              <a:t>06/02/2021</a:t>
+              <a:t>09/02/2021</a:t>
             </a:fld>
             <a:endParaRPr lang="es-ES"/>
           </a:p>
@@ -1776,7 +1777,7 @@
     </p:spTree>
     <p:extLst>
       <p:ext uri="{BB962C8B-B14F-4D97-AF65-F5344CB8AC3E}">
-        <p14:creationId xmlns:p14="http://schemas.microsoft.com/office/powerpoint/2010/main" val="4016247918"/>
+        <p14:creationId xmlns:p14="http://schemas.microsoft.com/office/powerpoint/2010/main" val="224697587"/>
       </p:ext>
     </p:extLst>
   </p:cSld>
@@ -1820,7 +1821,7 @@
           <a:p>
             <a:fld id="{97DAD922-42D4-406C-9C0D-B091530F4F9B}" type="datetimeFigureOut">
               <a:rPr lang="es-ES" smtClean="0"/>
-              <a:t>06/02/2021</a:t>
+              <a:t>09/02/2021</a:t>
             </a:fld>
             <a:endParaRPr lang="es-ES"/>
           </a:p>
@@ -1871,7 +1872,7 @@
     </p:spTree>
     <p:extLst>
       <p:ext uri="{BB962C8B-B14F-4D97-AF65-F5344CB8AC3E}">
-        <p14:creationId xmlns:p14="http://schemas.microsoft.com/office/powerpoint/2010/main" val="1889643755"/>
+        <p14:creationId xmlns:p14="http://schemas.microsoft.com/office/powerpoint/2010/main" val="2851994174"/>
       </p:ext>
     </p:extLst>
   </p:cSld>
@@ -1910,15 +1911,15 @@
         </p:nvSpPr>
         <p:spPr>
           <a:xfrm>
-            <a:off x="472381" y="812800"/>
-            <a:ext cx="2211884" cy="2844800"/>
+            <a:off x="839788" y="457200"/>
+            <a:ext cx="3932237" cy="1600200"/>
           </a:xfrm>
         </p:spPr>
         <p:txBody>
           <a:bodyPr anchor="b"/>
           <a:lstStyle>
             <a:lvl1pPr>
-              <a:defRPr sz="2400"/>
+              <a:defRPr sz="3200"/>
             </a:lvl1pPr>
           </a:lstStyle>
           <a:p>
@@ -1942,39 +1943,39 @@
         </p:nvSpPr>
         <p:spPr>
           <a:xfrm>
-            <a:off x="2915543" y="1755425"/>
-            <a:ext cx="3471863" cy="8664222"/>
+            <a:off x="5183188" y="987425"/>
+            <a:ext cx="6172200" cy="4873625"/>
           </a:xfrm>
         </p:spPr>
         <p:txBody>
           <a:bodyPr/>
           <a:lstStyle>
             <a:lvl1pPr>
-              <a:defRPr sz="2400"/>
+              <a:defRPr sz="3200"/>
             </a:lvl1pPr>
             <a:lvl2pPr>
-              <a:defRPr sz="2100"/>
+              <a:defRPr sz="2800"/>
             </a:lvl2pPr>
             <a:lvl3pPr>
-              <a:defRPr sz="1800"/>
+              <a:defRPr sz="2400"/>
             </a:lvl3pPr>
             <a:lvl4pPr>
-              <a:defRPr sz="1500"/>
+              <a:defRPr sz="2000"/>
             </a:lvl4pPr>
             <a:lvl5pPr>
-              <a:defRPr sz="1500"/>
+              <a:defRPr sz="2000"/>
             </a:lvl5pPr>
             <a:lvl6pPr>
-              <a:defRPr sz="1500"/>
+              <a:defRPr sz="2000"/>
             </a:lvl6pPr>
             <a:lvl7pPr>
-              <a:defRPr sz="1500"/>
+              <a:defRPr sz="2000"/>
             </a:lvl7pPr>
             <a:lvl8pPr>
-              <a:defRPr sz="1500"/>
+              <a:defRPr sz="2000"/>
             </a:lvl8pPr>
             <a:lvl9pPr>
-              <a:defRPr sz="1500"/>
+              <a:defRPr sz="2000"/>
             </a:lvl9pPr>
           </a:lstStyle>
           <a:p>
@@ -2027,8 +2028,8 @@
         </p:nvSpPr>
         <p:spPr>
           <a:xfrm>
-            <a:off x="472381" y="3657600"/>
-            <a:ext cx="2211884" cy="6776156"/>
+            <a:off x="839788" y="2057400"/>
+            <a:ext cx="3932237" cy="3811588"/>
           </a:xfrm>
         </p:spPr>
         <p:txBody>
@@ -2036,39 +2037,39 @@
           <a:lstStyle>
             <a:lvl1pPr marL="0" indent="0">
               <a:buNone/>
+              <a:defRPr sz="1600"/>
+            </a:lvl1pPr>
+            <a:lvl2pPr marL="457200" indent="0">
+              <a:buNone/>
+              <a:defRPr sz="1400"/>
+            </a:lvl2pPr>
+            <a:lvl3pPr marL="914400" indent="0">
+              <a:buNone/>
               <a:defRPr sz="1200"/>
-            </a:lvl1pPr>
-            <a:lvl2pPr marL="342900" indent="0">
-              <a:buNone/>
-              <a:defRPr sz="1050"/>
-            </a:lvl2pPr>
-            <a:lvl3pPr marL="685800" indent="0">
-              <a:buNone/>
-              <a:defRPr sz="900"/>
             </a:lvl3pPr>
-            <a:lvl4pPr marL="1028700" indent="0">
-              <a:buNone/>
-              <a:defRPr sz="750"/>
+            <a:lvl4pPr marL="1371600" indent="0">
+              <a:buNone/>
+              <a:defRPr sz="1000"/>
             </a:lvl4pPr>
-            <a:lvl5pPr marL="1371600" indent="0">
-              <a:buNone/>
-              <a:defRPr sz="750"/>
+            <a:lvl5pPr marL="1828800" indent="0">
+              <a:buNone/>
+              <a:defRPr sz="1000"/>
             </a:lvl5pPr>
-            <a:lvl6pPr marL="1714500" indent="0">
-              <a:buNone/>
-              <a:defRPr sz="750"/>
+            <a:lvl6pPr marL="2286000" indent="0">
+              <a:buNone/>
+              <a:defRPr sz="1000"/>
             </a:lvl6pPr>
-            <a:lvl7pPr marL="2057400" indent="0">
-              <a:buNone/>
-              <a:defRPr sz="750"/>
+            <a:lvl7pPr marL="2743200" indent="0">
+              <a:buNone/>
+              <a:defRPr sz="1000"/>
             </a:lvl7pPr>
-            <a:lvl8pPr marL="2400300" indent="0">
-              <a:buNone/>
-              <a:defRPr sz="750"/>
+            <a:lvl8pPr marL="3200400" indent="0">
+              <a:buNone/>
+              <a:defRPr sz="1000"/>
             </a:lvl8pPr>
-            <a:lvl9pPr marL="2743200" indent="0">
-              <a:buNone/>
-              <a:defRPr sz="750"/>
+            <a:lvl9pPr marL="3657600" indent="0">
+              <a:buNone/>
+              <a:defRPr sz="1000"/>
             </a:lvl9pPr>
           </a:lstStyle>
           <a:p>
@@ -2097,7 +2098,7 @@
           <a:p>
             <a:fld id="{97DAD922-42D4-406C-9C0D-B091530F4F9B}" type="datetimeFigureOut">
               <a:rPr lang="es-ES" smtClean="0"/>
-              <a:t>06/02/2021</a:t>
+              <a:t>09/02/2021</a:t>
             </a:fld>
             <a:endParaRPr lang="es-ES"/>
           </a:p>
@@ -2148,7 +2149,7 @@
     </p:spTree>
     <p:extLst>
       <p:ext uri="{BB962C8B-B14F-4D97-AF65-F5344CB8AC3E}">
-        <p14:creationId xmlns:p14="http://schemas.microsoft.com/office/powerpoint/2010/main" val="1930760853"/>
+        <p14:creationId xmlns:p14="http://schemas.microsoft.com/office/powerpoint/2010/main" val="3041107312"/>
       </p:ext>
     </p:extLst>
   </p:cSld>
@@ -2187,15 +2188,15 @@
         </p:nvSpPr>
         <p:spPr>
           <a:xfrm>
-            <a:off x="472381" y="812800"/>
-            <a:ext cx="2211884" cy="2844800"/>
+            <a:off x="839788" y="457200"/>
+            <a:ext cx="3932237" cy="1600200"/>
           </a:xfrm>
         </p:spPr>
         <p:txBody>
           <a:bodyPr anchor="b"/>
           <a:lstStyle>
             <a:lvl1pPr>
-              <a:defRPr sz="2400"/>
+              <a:defRPr sz="3200"/>
             </a:lvl1pPr>
           </a:lstStyle>
           <a:p>
@@ -2219,8 +2220,8 @@
         </p:nvSpPr>
         <p:spPr>
           <a:xfrm>
-            <a:off x="2915543" y="1755425"/>
-            <a:ext cx="3471863" cy="8664222"/>
+            <a:off x="5183188" y="987425"/>
+            <a:ext cx="6172200" cy="4873625"/>
           </a:xfrm>
         </p:spPr>
         <p:txBody>
@@ -2228,39 +2229,39 @@
           <a:lstStyle>
             <a:lvl1pPr marL="0" indent="0">
               <a:buNone/>
+              <a:defRPr sz="3200"/>
+            </a:lvl1pPr>
+            <a:lvl2pPr marL="457200" indent="0">
+              <a:buNone/>
+              <a:defRPr sz="2800"/>
+            </a:lvl2pPr>
+            <a:lvl3pPr marL="914400" indent="0">
+              <a:buNone/>
               <a:defRPr sz="2400"/>
-            </a:lvl1pPr>
-            <a:lvl2pPr marL="342900" indent="0">
-              <a:buNone/>
-              <a:defRPr sz="2100"/>
-            </a:lvl2pPr>
-            <a:lvl3pPr marL="685800" indent="0">
-              <a:buNone/>
-              <a:defRPr sz="1800"/>
             </a:lvl3pPr>
-            <a:lvl4pPr marL="1028700" indent="0">
-              <a:buNone/>
-              <a:defRPr sz="1500"/>
+            <a:lvl4pPr marL="1371600" indent="0">
+              <a:buNone/>
+              <a:defRPr sz="2000"/>
             </a:lvl4pPr>
-            <a:lvl5pPr marL="1371600" indent="0">
-              <a:buNone/>
-              <a:defRPr sz="1500"/>
+            <a:lvl5pPr marL="1828800" indent="0">
+              <a:buNone/>
+              <a:defRPr sz="2000"/>
             </a:lvl5pPr>
-            <a:lvl6pPr marL="1714500" indent="0">
-              <a:buNone/>
-              <a:defRPr sz="1500"/>
+            <a:lvl6pPr marL="2286000" indent="0">
+              <a:buNone/>
+              <a:defRPr sz="2000"/>
             </a:lvl6pPr>
-            <a:lvl7pPr marL="2057400" indent="0">
-              <a:buNone/>
-              <a:defRPr sz="1500"/>
+            <a:lvl7pPr marL="2743200" indent="0">
+              <a:buNone/>
+              <a:defRPr sz="2000"/>
             </a:lvl7pPr>
-            <a:lvl8pPr marL="2400300" indent="0">
-              <a:buNone/>
-              <a:defRPr sz="1500"/>
+            <a:lvl8pPr marL="3200400" indent="0">
+              <a:buNone/>
+              <a:defRPr sz="2000"/>
             </a:lvl8pPr>
-            <a:lvl9pPr marL="2743200" indent="0">
-              <a:buNone/>
-              <a:defRPr sz="1500"/>
+            <a:lvl9pPr marL="3657600" indent="0">
+              <a:buNone/>
+              <a:defRPr sz="2000"/>
             </a:lvl9pPr>
           </a:lstStyle>
           <a:p>
@@ -2268,7 +2269,7 @@
               <a:rPr lang="es-ES"/>
               <a:t>Haga clic en el icono para agregar una imagen</a:t>
             </a:r>
-            <a:endParaRPr lang="en-US"/>
+            <a:endParaRPr lang="en-US" dirty="0"/>
           </a:p>
         </p:txBody>
       </p:sp>
@@ -2284,8 +2285,8 @@
         </p:nvSpPr>
         <p:spPr>
           <a:xfrm>
-            <a:off x="472381" y="3657600"/>
-            <a:ext cx="2211884" cy="6776156"/>
+            <a:off x="839788" y="2057400"/>
+            <a:ext cx="3932237" cy="3811588"/>
           </a:xfrm>
         </p:spPr>
         <p:txBody>
@@ -2293,39 +2294,39 @@
           <a:lstStyle>
             <a:lvl1pPr marL="0" indent="0">
               <a:buNone/>
+              <a:defRPr sz="1600"/>
+            </a:lvl1pPr>
+            <a:lvl2pPr marL="457200" indent="0">
+              <a:buNone/>
+              <a:defRPr sz="1400"/>
+            </a:lvl2pPr>
+            <a:lvl3pPr marL="914400" indent="0">
+              <a:buNone/>
               <a:defRPr sz="1200"/>
-            </a:lvl1pPr>
-            <a:lvl2pPr marL="342900" indent="0">
-              <a:buNone/>
-              <a:defRPr sz="1050"/>
-            </a:lvl2pPr>
-            <a:lvl3pPr marL="685800" indent="0">
-              <a:buNone/>
-              <a:defRPr sz="900"/>
             </a:lvl3pPr>
-            <a:lvl4pPr marL="1028700" indent="0">
-              <a:buNone/>
-              <a:defRPr sz="750"/>
+            <a:lvl4pPr marL="1371600" indent="0">
+              <a:buNone/>
+              <a:defRPr sz="1000"/>
             </a:lvl4pPr>
-            <a:lvl5pPr marL="1371600" indent="0">
-              <a:buNone/>
-              <a:defRPr sz="750"/>
+            <a:lvl5pPr marL="1828800" indent="0">
+              <a:buNone/>
+              <a:defRPr sz="1000"/>
             </a:lvl5pPr>
-            <a:lvl6pPr marL="1714500" indent="0">
-              <a:buNone/>
-              <a:defRPr sz="750"/>
+            <a:lvl6pPr marL="2286000" indent="0">
+              <a:buNone/>
+              <a:defRPr sz="1000"/>
             </a:lvl6pPr>
-            <a:lvl7pPr marL="2057400" indent="0">
-              <a:buNone/>
-              <a:defRPr sz="750"/>
+            <a:lvl7pPr marL="2743200" indent="0">
+              <a:buNone/>
+              <a:defRPr sz="1000"/>
             </a:lvl7pPr>
-            <a:lvl8pPr marL="2400300" indent="0">
-              <a:buNone/>
-              <a:defRPr sz="750"/>
+            <a:lvl8pPr marL="3200400" indent="0">
+              <a:buNone/>
+              <a:defRPr sz="1000"/>
             </a:lvl8pPr>
-            <a:lvl9pPr marL="2743200" indent="0">
-              <a:buNone/>
-              <a:defRPr sz="750"/>
+            <a:lvl9pPr marL="3657600" indent="0">
+              <a:buNone/>
+              <a:defRPr sz="1000"/>
             </a:lvl9pPr>
           </a:lstStyle>
           <a:p>
@@ -2354,7 +2355,7 @@
           <a:p>
             <a:fld id="{97DAD922-42D4-406C-9C0D-B091530F4F9B}" type="datetimeFigureOut">
               <a:rPr lang="es-ES" smtClean="0"/>
-              <a:t>06/02/2021</a:t>
+              <a:t>09/02/2021</a:t>
             </a:fld>
             <a:endParaRPr lang="es-ES"/>
           </a:p>
@@ -2405,7 +2406,7 @@
     </p:spTree>
     <p:extLst>
       <p:ext uri="{BB962C8B-B14F-4D97-AF65-F5344CB8AC3E}">
-        <p14:creationId xmlns:p14="http://schemas.microsoft.com/office/powerpoint/2010/main" val="1216825480"/>
+        <p14:creationId xmlns:p14="http://schemas.microsoft.com/office/powerpoint/2010/main" val="2023721946"/>
       </p:ext>
     </p:extLst>
   </p:cSld>
@@ -2449,8 +2450,8 @@
         </p:nvSpPr>
         <p:spPr>
           <a:xfrm>
-            <a:off x="471488" y="649114"/>
-            <a:ext cx="5915025" cy="2356556"/>
+            <a:off x="838200" y="365125"/>
+            <a:ext cx="10515600" cy="1325563"/>
           </a:xfrm>
           <a:prstGeom prst="rect">
             <a:avLst/>
@@ -2482,8 +2483,8 @@
         </p:nvSpPr>
         <p:spPr>
           <a:xfrm>
-            <a:off x="471488" y="3245556"/>
-            <a:ext cx="5915025" cy="7735712"/>
+            <a:off x="838200" y="1825625"/>
+            <a:ext cx="10515600" cy="4351338"/>
           </a:xfrm>
           <a:prstGeom prst="rect">
             <a:avLst/>
@@ -2544,8 +2545,8 @@
         </p:nvSpPr>
         <p:spPr>
           <a:xfrm>
-            <a:off x="471488" y="11300181"/>
-            <a:ext cx="1543050" cy="649111"/>
+            <a:off x="838200" y="6356350"/>
+            <a:ext cx="2743200" cy="365125"/>
           </a:xfrm>
           <a:prstGeom prst="rect">
             <a:avLst/>
@@ -2555,7 +2556,7 @@
           <a:bodyPr vert="horz" lIns="91440" tIns="45720" rIns="91440" bIns="45720" rtlCol="0" anchor="ctr"/>
           <a:lstStyle>
             <a:lvl1pPr algn="l">
-              <a:defRPr sz="900">
+              <a:defRPr sz="1200">
                 <a:solidFill>
                   <a:schemeClr val="tx1">
                     <a:tint val="75000"/>
@@ -2567,7 +2568,7 @@
           <a:p>
             <a:fld id="{97DAD922-42D4-406C-9C0D-B091530F4F9B}" type="datetimeFigureOut">
               <a:rPr lang="es-ES" smtClean="0"/>
-              <a:t>06/02/2021</a:t>
+              <a:t>09/02/2021</a:t>
             </a:fld>
             <a:endParaRPr lang="es-ES"/>
           </a:p>
@@ -2585,8 +2586,8 @@
         </p:nvSpPr>
         <p:spPr>
           <a:xfrm>
-            <a:off x="2271713" y="11300181"/>
-            <a:ext cx="2314575" cy="649111"/>
+            <a:off x="4038600" y="6356350"/>
+            <a:ext cx="4114800" cy="365125"/>
           </a:xfrm>
           <a:prstGeom prst="rect">
             <a:avLst/>
@@ -2596,7 +2597,7 @@
           <a:bodyPr vert="horz" lIns="91440" tIns="45720" rIns="91440" bIns="45720" rtlCol="0" anchor="ctr"/>
           <a:lstStyle>
             <a:lvl1pPr algn="ctr">
-              <a:defRPr sz="900">
+              <a:defRPr sz="1200">
                 <a:solidFill>
                   <a:schemeClr val="tx1">
                     <a:tint val="75000"/>
@@ -2622,8 +2623,8 @@
         </p:nvSpPr>
         <p:spPr>
           <a:xfrm>
-            <a:off x="4843463" y="11300181"/>
-            <a:ext cx="1543050" cy="649111"/>
+            <a:off x="8610600" y="6356350"/>
+            <a:ext cx="2743200" cy="365125"/>
           </a:xfrm>
           <a:prstGeom prst="rect">
             <a:avLst/>
@@ -2633,7 +2634,7 @@
           <a:bodyPr vert="horz" lIns="91440" tIns="45720" rIns="91440" bIns="45720" rtlCol="0" anchor="ctr"/>
           <a:lstStyle>
             <a:lvl1pPr algn="r">
-              <a:defRPr sz="900">
+              <a:defRPr sz="1200">
                 <a:solidFill>
                   <a:schemeClr val="tx1">
                     <a:tint val="75000"/>
@@ -2654,27 +2655,27 @@
     </p:spTree>
     <p:extLst>
       <p:ext uri="{BB962C8B-B14F-4D97-AF65-F5344CB8AC3E}">
-        <p14:creationId xmlns:p14="http://schemas.microsoft.com/office/powerpoint/2010/main" val="1252541149"/>
+        <p14:creationId xmlns:p14="http://schemas.microsoft.com/office/powerpoint/2010/main" val="3538773227"/>
       </p:ext>
     </p:extLst>
   </p:cSld>
   <p:clrMap bg1="lt1" tx1="dk1" bg2="lt2" tx2="dk2" accent1="accent1" accent2="accent2" accent3="accent3" accent4="accent4" accent5="accent5" accent6="accent6" hlink="hlink" folHlink="folHlink"/>
   <p:sldLayoutIdLst>
-    <p:sldLayoutId id="2147483661" r:id="rId1"/>
-    <p:sldLayoutId id="2147483662" r:id="rId2"/>
-    <p:sldLayoutId id="2147483663" r:id="rId3"/>
-    <p:sldLayoutId id="2147483664" r:id="rId4"/>
-    <p:sldLayoutId id="2147483665" r:id="rId5"/>
-    <p:sldLayoutId id="2147483666" r:id="rId6"/>
-    <p:sldLayoutId id="2147483667" r:id="rId7"/>
-    <p:sldLayoutId id="2147483668" r:id="rId8"/>
-    <p:sldLayoutId id="2147483669" r:id="rId9"/>
-    <p:sldLayoutId id="2147483670" r:id="rId10"/>
-    <p:sldLayoutId id="2147483671" r:id="rId11"/>
+    <p:sldLayoutId id="2147483673" r:id="rId1"/>
+    <p:sldLayoutId id="2147483674" r:id="rId2"/>
+    <p:sldLayoutId id="2147483675" r:id="rId3"/>
+    <p:sldLayoutId id="2147483676" r:id="rId4"/>
+    <p:sldLayoutId id="2147483677" r:id="rId5"/>
+    <p:sldLayoutId id="2147483678" r:id="rId6"/>
+    <p:sldLayoutId id="2147483679" r:id="rId7"/>
+    <p:sldLayoutId id="2147483680" r:id="rId8"/>
+    <p:sldLayoutId id="2147483681" r:id="rId9"/>
+    <p:sldLayoutId id="2147483682" r:id="rId10"/>
+    <p:sldLayoutId id="2147483683" r:id="rId11"/>
   </p:sldLayoutIdLst>
   <p:txStyles>
     <p:titleStyle>
-      <a:lvl1pPr algn="l" defTabSz="685800" rtl="0" eaLnBrk="1" latinLnBrk="0" hangingPunct="1">
+      <a:lvl1pPr algn="l" defTabSz="914400" rtl="0" eaLnBrk="1" latinLnBrk="0" hangingPunct="1">
         <a:lnSpc>
           <a:spcPct val="90000"/>
         </a:lnSpc>
@@ -2682,7 +2683,7 @@
           <a:spcPct val="0"/>
         </a:spcBef>
         <a:buNone/>
-        <a:defRPr sz="3300" kern="1200">
+        <a:defRPr sz="4400" kern="1200">
           <a:solidFill>
             <a:schemeClr val="tx1"/>
           </a:solidFill>
@@ -2693,16 +2694,16 @@
       </a:lvl1pPr>
     </p:titleStyle>
     <p:bodyStyle>
-      <a:lvl1pPr marL="171450" indent="-171450" algn="l" defTabSz="685800" rtl="0" eaLnBrk="1" latinLnBrk="0" hangingPunct="1">
+      <a:lvl1pPr marL="228600" indent="-228600" algn="l" defTabSz="914400" rtl="0" eaLnBrk="1" latinLnBrk="0" hangingPunct="1">
         <a:lnSpc>
           <a:spcPct val="90000"/>
         </a:lnSpc>
         <a:spcBef>
-          <a:spcPts val="750"/>
+          <a:spcPts val="1000"/>
         </a:spcBef>
         <a:buFont typeface="Arial" panose="020B0604020202020204" pitchFamily="34" charset="0"/>
         <a:buChar char="•"/>
-        <a:defRPr sz="2100" kern="1200">
+        <a:defRPr sz="2800" kern="1200">
           <a:solidFill>
             <a:schemeClr val="tx1"/>
           </a:solidFill>
@@ -2711,12 +2712,48 @@
           <a:cs typeface="+mn-cs"/>
         </a:defRPr>
       </a:lvl1pPr>
-      <a:lvl2pPr marL="514350" indent="-171450" algn="l" defTabSz="685800" rtl="0" eaLnBrk="1" latinLnBrk="0" hangingPunct="1">
+      <a:lvl2pPr marL="685800" indent="-228600" algn="l" defTabSz="914400" rtl="0" eaLnBrk="1" latinLnBrk="0" hangingPunct="1">
         <a:lnSpc>
           <a:spcPct val="90000"/>
         </a:lnSpc>
         <a:spcBef>
-          <a:spcPts val="375"/>
+          <a:spcPts val="500"/>
+        </a:spcBef>
+        <a:buFont typeface="Arial" panose="020B0604020202020204" pitchFamily="34" charset="0"/>
+        <a:buChar char="•"/>
+        <a:defRPr sz="2400" kern="1200">
+          <a:solidFill>
+            <a:schemeClr val="tx1"/>
+          </a:solidFill>
+          <a:latin typeface="+mn-lt"/>
+          <a:ea typeface="+mn-ea"/>
+          <a:cs typeface="+mn-cs"/>
+        </a:defRPr>
+      </a:lvl2pPr>
+      <a:lvl3pPr marL="1143000" indent="-228600" algn="l" defTabSz="914400" rtl="0" eaLnBrk="1" latinLnBrk="0" hangingPunct="1">
+        <a:lnSpc>
+          <a:spcPct val="90000"/>
+        </a:lnSpc>
+        <a:spcBef>
+          <a:spcPts val="500"/>
+        </a:spcBef>
+        <a:buFont typeface="Arial" panose="020B0604020202020204" pitchFamily="34" charset="0"/>
+        <a:buChar char="•"/>
+        <a:defRPr sz="2000" kern="1200">
+          <a:solidFill>
+            <a:schemeClr val="tx1"/>
+          </a:solidFill>
+          <a:latin typeface="+mn-lt"/>
+          <a:ea typeface="+mn-ea"/>
+          <a:cs typeface="+mn-cs"/>
+        </a:defRPr>
+      </a:lvl3pPr>
+      <a:lvl4pPr marL="1600200" indent="-228600" algn="l" defTabSz="914400" rtl="0" eaLnBrk="1" latinLnBrk="0" hangingPunct="1">
+        <a:lnSpc>
+          <a:spcPct val="90000"/>
+        </a:lnSpc>
+        <a:spcBef>
+          <a:spcPts val="500"/>
         </a:spcBef>
         <a:buFont typeface="Arial" panose="020B0604020202020204" pitchFamily="34" charset="0"/>
         <a:buChar char="•"/>
@@ -2728,53 +2765,17 @@
           <a:ea typeface="+mn-ea"/>
           <a:cs typeface="+mn-cs"/>
         </a:defRPr>
-      </a:lvl2pPr>
-      <a:lvl3pPr marL="857250" indent="-171450" algn="l" defTabSz="685800" rtl="0" eaLnBrk="1" latinLnBrk="0" hangingPunct="1">
+      </a:lvl4pPr>
+      <a:lvl5pPr marL="2057400" indent="-228600" algn="l" defTabSz="914400" rtl="0" eaLnBrk="1" latinLnBrk="0" hangingPunct="1">
         <a:lnSpc>
           <a:spcPct val="90000"/>
         </a:lnSpc>
         <a:spcBef>
-          <a:spcPts val="375"/>
+          <a:spcPts val="500"/>
         </a:spcBef>
         <a:buFont typeface="Arial" panose="020B0604020202020204" pitchFamily="34" charset="0"/>
         <a:buChar char="•"/>
-        <a:defRPr sz="1500" kern="1200">
-          <a:solidFill>
-            <a:schemeClr val="tx1"/>
-          </a:solidFill>
-          <a:latin typeface="+mn-lt"/>
-          <a:ea typeface="+mn-ea"/>
-          <a:cs typeface="+mn-cs"/>
-        </a:defRPr>
-      </a:lvl3pPr>
-      <a:lvl4pPr marL="1200150" indent="-171450" algn="l" defTabSz="685800" rtl="0" eaLnBrk="1" latinLnBrk="0" hangingPunct="1">
-        <a:lnSpc>
-          <a:spcPct val="90000"/>
-        </a:lnSpc>
-        <a:spcBef>
-          <a:spcPts val="375"/>
-        </a:spcBef>
-        <a:buFont typeface="Arial" panose="020B0604020202020204" pitchFamily="34" charset="0"/>
-        <a:buChar char="•"/>
-        <a:defRPr sz="1350" kern="1200">
-          <a:solidFill>
-            <a:schemeClr val="tx1"/>
-          </a:solidFill>
-          <a:latin typeface="+mn-lt"/>
-          <a:ea typeface="+mn-ea"/>
-          <a:cs typeface="+mn-cs"/>
-        </a:defRPr>
-      </a:lvl4pPr>
-      <a:lvl5pPr marL="1543050" indent="-171450" algn="l" defTabSz="685800" rtl="0" eaLnBrk="1" latinLnBrk="0" hangingPunct="1">
-        <a:lnSpc>
-          <a:spcPct val="90000"/>
-        </a:lnSpc>
-        <a:spcBef>
-          <a:spcPts val="375"/>
-        </a:spcBef>
-        <a:buFont typeface="Arial" panose="020B0604020202020204" pitchFamily="34" charset="0"/>
-        <a:buChar char="•"/>
-        <a:defRPr sz="1350" kern="1200">
+        <a:defRPr sz="1800" kern="1200">
           <a:solidFill>
             <a:schemeClr val="tx1"/>
           </a:solidFill>
@@ -2783,16 +2784,16 @@
           <a:cs typeface="+mn-cs"/>
         </a:defRPr>
       </a:lvl5pPr>
-      <a:lvl6pPr marL="1885950" indent="-171450" algn="l" defTabSz="685800" rtl="0" eaLnBrk="1" latinLnBrk="0" hangingPunct="1">
+      <a:lvl6pPr marL="2514600" indent="-228600" algn="l" defTabSz="914400" rtl="0" eaLnBrk="1" latinLnBrk="0" hangingPunct="1">
         <a:lnSpc>
           <a:spcPct val="90000"/>
         </a:lnSpc>
         <a:spcBef>
-          <a:spcPts val="375"/>
+          <a:spcPts val="500"/>
         </a:spcBef>
         <a:buFont typeface="Arial" panose="020B0604020202020204" pitchFamily="34" charset="0"/>
         <a:buChar char="•"/>
-        <a:defRPr sz="1350" kern="1200">
+        <a:defRPr sz="1800" kern="1200">
           <a:solidFill>
             <a:schemeClr val="tx1"/>
           </a:solidFill>
@@ -2801,16 +2802,16 @@
           <a:cs typeface="+mn-cs"/>
         </a:defRPr>
       </a:lvl6pPr>
-      <a:lvl7pPr marL="2228850" indent="-171450" algn="l" defTabSz="685800" rtl="0" eaLnBrk="1" latinLnBrk="0" hangingPunct="1">
+      <a:lvl7pPr marL="2971800" indent="-228600" algn="l" defTabSz="914400" rtl="0" eaLnBrk="1" latinLnBrk="0" hangingPunct="1">
         <a:lnSpc>
           <a:spcPct val="90000"/>
         </a:lnSpc>
         <a:spcBef>
-          <a:spcPts val="375"/>
+          <a:spcPts val="500"/>
         </a:spcBef>
         <a:buFont typeface="Arial" panose="020B0604020202020204" pitchFamily="34" charset="0"/>
         <a:buChar char="•"/>
-        <a:defRPr sz="1350" kern="1200">
+        <a:defRPr sz="1800" kern="1200">
           <a:solidFill>
             <a:schemeClr val="tx1"/>
           </a:solidFill>
@@ -2819,16 +2820,16 @@
           <a:cs typeface="+mn-cs"/>
         </a:defRPr>
       </a:lvl7pPr>
-      <a:lvl8pPr marL="2571750" indent="-171450" algn="l" defTabSz="685800" rtl="0" eaLnBrk="1" latinLnBrk="0" hangingPunct="1">
+      <a:lvl8pPr marL="3429000" indent="-228600" algn="l" defTabSz="914400" rtl="0" eaLnBrk="1" latinLnBrk="0" hangingPunct="1">
         <a:lnSpc>
           <a:spcPct val="90000"/>
         </a:lnSpc>
         <a:spcBef>
-          <a:spcPts val="375"/>
+          <a:spcPts val="500"/>
         </a:spcBef>
         <a:buFont typeface="Arial" panose="020B0604020202020204" pitchFamily="34" charset="0"/>
         <a:buChar char="•"/>
-        <a:defRPr sz="1350" kern="1200">
+        <a:defRPr sz="1800" kern="1200">
           <a:solidFill>
             <a:schemeClr val="tx1"/>
           </a:solidFill>
@@ -2837,16 +2838,16 @@
           <a:cs typeface="+mn-cs"/>
         </a:defRPr>
       </a:lvl8pPr>
-      <a:lvl9pPr marL="2914650" indent="-171450" algn="l" defTabSz="685800" rtl="0" eaLnBrk="1" latinLnBrk="0" hangingPunct="1">
+      <a:lvl9pPr marL="3886200" indent="-228600" algn="l" defTabSz="914400" rtl="0" eaLnBrk="1" latinLnBrk="0" hangingPunct="1">
         <a:lnSpc>
           <a:spcPct val="90000"/>
         </a:lnSpc>
         <a:spcBef>
-          <a:spcPts val="375"/>
+          <a:spcPts val="500"/>
         </a:spcBef>
         <a:buFont typeface="Arial" panose="020B0604020202020204" pitchFamily="34" charset="0"/>
         <a:buChar char="•"/>
-        <a:defRPr sz="1350" kern="1200">
+        <a:defRPr sz="1800" kern="1200">
           <a:solidFill>
             <a:schemeClr val="tx1"/>
           </a:solidFill>
@@ -2860,8 +2861,8 @@
       <a:defPPr>
         <a:defRPr lang="en-US"/>
       </a:defPPr>
-      <a:lvl1pPr marL="0" algn="l" defTabSz="685800" rtl="0" eaLnBrk="1" latinLnBrk="0" hangingPunct="1">
-        <a:defRPr sz="1350" kern="1200">
+      <a:lvl1pPr marL="0" algn="l" defTabSz="914400" rtl="0" eaLnBrk="1" latinLnBrk="0" hangingPunct="1">
+        <a:defRPr sz="1800" kern="1200">
           <a:solidFill>
             <a:schemeClr val="tx1"/>
           </a:solidFill>
@@ -2870,8 +2871,8 @@
           <a:cs typeface="+mn-cs"/>
         </a:defRPr>
       </a:lvl1pPr>
-      <a:lvl2pPr marL="342900" algn="l" defTabSz="685800" rtl="0" eaLnBrk="1" latinLnBrk="0" hangingPunct="1">
-        <a:defRPr sz="1350" kern="1200">
+      <a:lvl2pPr marL="457200" algn="l" defTabSz="914400" rtl="0" eaLnBrk="1" latinLnBrk="0" hangingPunct="1">
+        <a:defRPr sz="1800" kern="1200">
           <a:solidFill>
             <a:schemeClr val="tx1"/>
           </a:solidFill>
@@ -2880,8 +2881,8 @@
           <a:cs typeface="+mn-cs"/>
         </a:defRPr>
       </a:lvl2pPr>
-      <a:lvl3pPr marL="685800" algn="l" defTabSz="685800" rtl="0" eaLnBrk="1" latinLnBrk="0" hangingPunct="1">
-        <a:defRPr sz="1350" kern="1200">
+      <a:lvl3pPr marL="914400" algn="l" defTabSz="914400" rtl="0" eaLnBrk="1" latinLnBrk="0" hangingPunct="1">
+        <a:defRPr sz="1800" kern="1200">
           <a:solidFill>
             <a:schemeClr val="tx1"/>
           </a:solidFill>
@@ -2890,8 +2891,8 @@
           <a:cs typeface="+mn-cs"/>
         </a:defRPr>
       </a:lvl3pPr>
-      <a:lvl4pPr marL="1028700" algn="l" defTabSz="685800" rtl="0" eaLnBrk="1" latinLnBrk="0" hangingPunct="1">
-        <a:defRPr sz="1350" kern="1200">
+      <a:lvl4pPr marL="1371600" algn="l" defTabSz="914400" rtl="0" eaLnBrk="1" latinLnBrk="0" hangingPunct="1">
+        <a:defRPr sz="1800" kern="1200">
           <a:solidFill>
             <a:schemeClr val="tx1"/>
           </a:solidFill>
@@ -2900,8 +2901,8 @@
           <a:cs typeface="+mn-cs"/>
         </a:defRPr>
       </a:lvl4pPr>
-      <a:lvl5pPr marL="1371600" algn="l" defTabSz="685800" rtl="0" eaLnBrk="1" latinLnBrk="0" hangingPunct="1">
-        <a:defRPr sz="1350" kern="1200">
+      <a:lvl5pPr marL="1828800" algn="l" defTabSz="914400" rtl="0" eaLnBrk="1" latinLnBrk="0" hangingPunct="1">
+        <a:defRPr sz="1800" kern="1200">
           <a:solidFill>
             <a:schemeClr val="tx1"/>
           </a:solidFill>
@@ -2910,8 +2911,8 @@
           <a:cs typeface="+mn-cs"/>
         </a:defRPr>
       </a:lvl5pPr>
-      <a:lvl6pPr marL="1714500" algn="l" defTabSz="685800" rtl="0" eaLnBrk="1" latinLnBrk="0" hangingPunct="1">
-        <a:defRPr sz="1350" kern="1200">
+      <a:lvl6pPr marL="2286000" algn="l" defTabSz="914400" rtl="0" eaLnBrk="1" latinLnBrk="0" hangingPunct="1">
+        <a:defRPr sz="1800" kern="1200">
           <a:solidFill>
             <a:schemeClr val="tx1"/>
           </a:solidFill>
@@ -2920,8 +2921,8 @@
           <a:cs typeface="+mn-cs"/>
         </a:defRPr>
       </a:lvl6pPr>
-      <a:lvl7pPr marL="2057400" algn="l" defTabSz="685800" rtl="0" eaLnBrk="1" latinLnBrk="0" hangingPunct="1">
-        <a:defRPr sz="1350" kern="1200">
+      <a:lvl7pPr marL="2743200" algn="l" defTabSz="914400" rtl="0" eaLnBrk="1" latinLnBrk="0" hangingPunct="1">
+        <a:defRPr sz="1800" kern="1200">
           <a:solidFill>
             <a:schemeClr val="tx1"/>
           </a:solidFill>
@@ -2930,8 +2931,8 @@
           <a:cs typeface="+mn-cs"/>
         </a:defRPr>
       </a:lvl7pPr>
-      <a:lvl8pPr marL="2400300" algn="l" defTabSz="685800" rtl="0" eaLnBrk="1" latinLnBrk="0" hangingPunct="1">
-        <a:defRPr sz="1350" kern="1200">
+      <a:lvl8pPr marL="3200400" algn="l" defTabSz="914400" rtl="0" eaLnBrk="1" latinLnBrk="0" hangingPunct="1">
+        <a:defRPr sz="1800" kern="1200">
           <a:solidFill>
             <a:schemeClr val="tx1"/>
           </a:solidFill>
@@ -2940,8 +2941,8 @@
           <a:cs typeface="+mn-cs"/>
         </a:defRPr>
       </a:lvl8pPr>
-      <a:lvl9pPr marL="2743200" algn="l" defTabSz="685800" rtl="0" eaLnBrk="1" latinLnBrk="0" hangingPunct="1">
-        <a:defRPr sz="1350" kern="1200">
+      <a:lvl9pPr marL="3657600" algn="l" defTabSz="914400" rtl="0" eaLnBrk="1" latinLnBrk="0" hangingPunct="1">
+        <a:defRPr sz="1800" kern="1200">
           <a:solidFill>
             <a:schemeClr val="tx1"/>
           </a:solidFill>
@@ -2974,10 +2975,116 @@
       </p:grpSpPr>
       <p:sp>
         <p:nvSpPr>
-          <p:cNvPr id="4" name="CuadroTexto 3">
+          <p:cNvPr id="31" name="Rectángulo 30">
             <a:extLst>
               <a:ext uri="{FF2B5EF4-FFF2-40B4-BE49-F238E27FC236}">
-                <a16:creationId xmlns:a16="http://schemas.microsoft.com/office/drawing/2014/main" id="{35CB6EAF-234E-4C0C-B148-DBF23952A750}"/>
+                <a16:creationId xmlns:a16="http://schemas.microsoft.com/office/drawing/2014/main" id="{02D687EB-F32B-4DBB-94EC-904A09E49315}"/>
+              </a:ext>
+            </a:extLst>
+          </p:cNvPr>
+          <p:cNvSpPr/>
+          <p:nvPr/>
+        </p:nvSpPr>
+        <p:spPr>
+          <a:xfrm>
+            <a:off x="350121" y="435494"/>
+            <a:ext cx="11553857" cy="552905"/>
+          </a:xfrm>
+          <a:prstGeom prst="rect">
+            <a:avLst/>
+          </a:prstGeom>
+          <a:solidFill>
+            <a:schemeClr val="accent6">
+              <a:lumMod val="20000"/>
+              <a:lumOff val="80000"/>
+            </a:schemeClr>
+          </a:solidFill>
+          <a:ln w="3175"/>
+        </p:spPr>
+        <p:style>
+          <a:lnRef idx="2">
+            <a:schemeClr val="accent6">
+              <a:shade val="50000"/>
+            </a:schemeClr>
+          </a:lnRef>
+          <a:fillRef idx="1">
+            <a:schemeClr val="accent6"/>
+          </a:fillRef>
+          <a:effectRef idx="0">
+            <a:schemeClr val="accent6"/>
+          </a:effectRef>
+          <a:fontRef idx="minor">
+            <a:schemeClr val="lt1"/>
+          </a:fontRef>
+        </p:style>
+        <p:txBody>
+          <a:bodyPr rtlCol="0" anchor="ctr"/>
+          <a:lstStyle/>
+          <a:p>
+            <a:pPr algn="ctr"/>
+            <a:endParaRPr lang="es-ES"/>
+          </a:p>
+        </p:txBody>
+      </p:sp>
+      <p:sp>
+        <p:nvSpPr>
+          <p:cNvPr id="21" name="Rectángulo 20">
+            <a:extLst>
+              <a:ext uri="{FF2B5EF4-FFF2-40B4-BE49-F238E27FC236}">
+                <a16:creationId xmlns:a16="http://schemas.microsoft.com/office/drawing/2014/main" id="{64C0A3B6-DC8B-4C22-AAC3-07F87565B369}"/>
+              </a:ext>
+            </a:extLst>
+          </p:cNvPr>
+          <p:cNvSpPr/>
+          <p:nvPr/>
+        </p:nvSpPr>
+        <p:spPr>
+          <a:xfrm>
+            <a:off x="350121" y="1049913"/>
+            <a:ext cx="11553857" cy="2948814"/>
+          </a:xfrm>
+          <a:prstGeom prst="rect">
+            <a:avLst/>
+          </a:prstGeom>
+          <a:solidFill>
+            <a:schemeClr val="accent6">
+              <a:lumMod val="20000"/>
+              <a:lumOff val="80000"/>
+            </a:schemeClr>
+          </a:solidFill>
+          <a:ln w="3175"/>
+        </p:spPr>
+        <p:style>
+          <a:lnRef idx="2">
+            <a:schemeClr val="accent6">
+              <a:shade val="50000"/>
+            </a:schemeClr>
+          </a:lnRef>
+          <a:fillRef idx="1">
+            <a:schemeClr val="accent6"/>
+          </a:fillRef>
+          <a:effectRef idx="0">
+            <a:schemeClr val="accent6"/>
+          </a:effectRef>
+          <a:fontRef idx="minor">
+            <a:schemeClr val="lt1"/>
+          </a:fontRef>
+        </p:style>
+        <p:txBody>
+          <a:bodyPr rtlCol="0" anchor="ctr"/>
+          <a:lstStyle/>
+          <a:p>
+            <a:pPr algn="ctr"/>
+            <a:endParaRPr lang="es-ES"/>
+          </a:p>
+        </p:txBody>
+      </p:sp>
+      <p:sp>
+        <p:nvSpPr>
+          <p:cNvPr id="5" name="CuadroTexto 4">
+            <a:extLst>
+              <a:ext uri="{FF2B5EF4-FFF2-40B4-BE49-F238E27FC236}">
+                <a16:creationId xmlns:a16="http://schemas.microsoft.com/office/drawing/2014/main" id="{842AFC76-F49D-47FF-9879-4FB1F55FB46E}"/>
               </a:ext>
             </a:extLst>
           </p:cNvPr>
@@ -2986,8 +3093,8 @@
         </p:nvSpPr>
         <p:spPr>
           <a:xfrm>
-            <a:off x="412955" y="339213"/>
-            <a:ext cx="6002593" cy="8309967"/>
+            <a:off x="282929" y="90492"/>
+            <a:ext cx="1559642" cy="307777"/>
           </a:xfrm>
           <a:prstGeom prst="rect">
             <a:avLst/>
@@ -3001,173 +3108,18 @@
           <a:lstStyle/>
           <a:p>
             <a:r>
-              <a:rPr lang="es-ES"/>
-              <a:t>DIAGRAMA DE FLUJO</a:t>
-            </a:r>
-          </a:p>
-          <a:p>
-            <a:endParaRPr lang="es-ES"/>
-          </a:p>
-          <a:p>
-            <a:r>
-              <a:rPr lang="es-ES"/>
-              <a:t>Pasos:</a:t>
-            </a:r>
-          </a:p>
-          <a:p>
-            <a:r>
-              <a:rPr lang="es-ES"/>
-              <a:t>Antes de pintar el diagrama de flujo hazlo en forma de lista</a:t>
-            </a:r>
-          </a:p>
-          <a:p>
-            <a:endParaRPr lang="es-ES"/>
-          </a:p>
-          <a:p>
-            <a:pPr marL="342900" indent="-342900">
-              <a:buAutoNum type="arabicPeriod"/>
-            </a:pPr>
-            <a:r>
-              <a:rPr lang="es-ES"/>
-              <a:t>¿Qué debo hacer al arrancar la página?</a:t>
-            </a:r>
-          </a:p>
-          <a:p>
-            <a:pPr marL="342900" indent="-342900">
-              <a:buAutoNum type="arabicPeriod"/>
-            </a:pPr>
-            <a:r>
-              <a:rPr lang="es-ES"/>
-              <a:t>¿Qué eventos(acciones de la usuaria) debo escuchar?</a:t>
-            </a:r>
-          </a:p>
-          <a:p>
-            <a:pPr marL="342900" indent="-342900">
-              <a:buAutoNum type="arabicPeriod"/>
-            </a:pPr>
-            <a:r>
-              <a:rPr lang="es-ES"/>
-              <a:t>¿Son los eventos independientes?</a:t>
-            </a:r>
-            <a:r>
-              <a:rPr lang="es-ES" sz="1200"/>
-              <a:t> (ayuda: pregúntate si es “obligatorio” que la usuaria los haga)</a:t>
-            </a:r>
-          </a:p>
-          <a:p>
-            <a:pPr marL="342900" indent="-342900">
-              <a:buAutoNum type="arabicPeriod"/>
-            </a:pPr>
-            <a:r>
-              <a:rPr lang="es-ES"/>
-              <a:t>Indica cada evento independiente en el diagrama</a:t>
-            </a:r>
-          </a:p>
-          <a:p>
-            <a:pPr marL="342900" indent="-342900">
-              <a:buAutoNum type="arabicPeriod"/>
-            </a:pPr>
-            <a:r>
-              <a:rPr lang="es-ES"/>
-              <a:t>Indica los pasos que debe dar cada evento para producirse </a:t>
-            </a:r>
-            <a:r>
-              <a:rPr lang="es-ES" sz="1200"/>
-              <a:t>(ayuda: se lo más específica posible, por ejemplo: “coger el valor del input y filtrar las paletas” )</a:t>
-            </a:r>
-          </a:p>
-          <a:p>
-            <a:endParaRPr lang="es-ES"/>
-          </a:p>
-          <a:p>
-            <a:endParaRPr lang="es-ES"/>
-          </a:p>
-          <a:p>
-            <a:r>
-              <a:rPr lang="es-ES"/>
-              <a:t>Temas a tener en cuenta:</a:t>
-            </a:r>
-          </a:p>
-          <a:p>
-            <a:pPr marL="285750" indent="-285750">
-              <a:buFont typeface="Arial" panose="020B0604020202020204" pitchFamily="34" charset="0"/>
-              <a:buChar char="•"/>
-            </a:pPr>
-            <a:r>
-              <a:rPr lang="es-ES"/>
-              <a:t>Cuando marco o selecciono “algo” debo “guardar” ese algo en un array u objeto, para que no “desaparezca </a:t>
-            </a:r>
-            <a:r>
-              <a:rPr lang="es-ES" sz="1200"/>
-              <a:t>(en HTML pueden “perderse)</a:t>
-            </a:r>
-          </a:p>
-          <a:p>
-            <a:pPr marL="285750" indent="-285750">
-              <a:buFont typeface="Arial" panose="020B0604020202020204" pitchFamily="34" charset="0"/>
-              <a:buChar char="•"/>
-            </a:pPr>
-            <a:r>
-              <a:rPr lang="es-ES"/>
-              <a:t>El </a:t>
-            </a:r>
-            <a:r>
-              <a:rPr lang="es-ES" err="1"/>
-              <a:t>localStorage</a:t>
-            </a:r>
-            <a:r>
-              <a:rPr lang="es-ES"/>
-              <a:t> se produce al arrancar la página</a:t>
-            </a:r>
-          </a:p>
-          <a:p>
-            <a:endParaRPr lang="es-ES"/>
-          </a:p>
-          <a:p>
-            <a:pPr marL="285750" indent="-285750">
-              <a:buFont typeface="Arial" panose="020B0604020202020204" pitchFamily="34" charset="0"/>
-              <a:buChar char="•"/>
-            </a:pPr>
-            <a:r>
-              <a:rPr lang="es-ES"/>
-              <a:t>Evaluar qué funciones (caja) modifican datos y cuáles “pintan”</a:t>
-            </a:r>
-          </a:p>
-          <a:p>
-            <a:pPr marL="742950" lvl="1" indent="-285750">
-              <a:buFont typeface="Arial" panose="020B0604020202020204" pitchFamily="34" charset="0"/>
-              <a:buChar char="•"/>
-            </a:pPr>
-            <a:r>
-              <a:rPr lang="es-ES"/>
-              <a:t>Las funciones que arrancan la página y las funciones que manejan eventos solo deben modificar variables GLOBALES. Estas funciones no deben “pintar”.</a:t>
-            </a:r>
-          </a:p>
-          <a:p>
-            <a:pPr marL="742950" lvl="1" indent="-285750">
-              <a:buFont typeface="Arial" panose="020B0604020202020204" pitchFamily="34" charset="0"/>
-              <a:buChar char="•"/>
-            </a:pPr>
-            <a:r>
-              <a:rPr lang="es-ES"/>
-              <a:t>Después de que cualquier variable o constante global cambien SIEMPRE debemos REPINTAR todo, y VOLVER a ESCUCHAR eventos sobre los nuevos elementos creados. Estas funciones NO deben modificar datos</a:t>
-            </a:r>
-          </a:p>
-          <a:p>
-            <a:pPr marL="285750" indent="-285750">
-              <a:buFont typeface="Arial" panose="020B0604020202020204" pitchFamily="34" charset="0"/>
-              <a:buChar char="•"/>
-            </a:pPr>
-            <a:endParaRPr lang="es-ES"/>
-          </a:p>
-        </p:txBody>
-      </p:sp>
-      <p:sp>
-        <p:nvSpPr>
-          <p:cNvPr id="5" name="Diagrama de flujo: proceso 4">
+              <a:rPr lang="es-ES" sz="1400" b="1"/>
+              <a:t>Diagrama de flujo</a:t>
+            </a:r>
+          </a:p>
+        </p:txBody>
+      </p:sp>
+      <p:sp>
+        <p:nvSpPr>
+          <p:cNvPr id="18" name="Diagrama de flujo: proceso 17">
             <a:extLst>
               <a:ext uri="{FF2B5EF4-FFF2-40B4-BE49-F238E27FC236}">
-                <a16:creationId xmlns:a16="http://schemas.microsoft.com/office/drawing/2014/main" id="{C2F76B87-2D4A-416A-B50C-05B88AE57C97}"/>
+                <a16:creationId xmlns:a16="http://schemas.microsoft.com/office/drawing/2014/main" id="{D46555D8-8F8F-49B4-A101-D2B067C1F62C}"/>
               </a:ext>
             </a:extLst>
           </p:cNvPr>
@@ -3176,8 +3128,8 @@
         </p:nvSpPr>
         <p:spPr>
           <a:xfrm>
-            <a:off x="878345" y="8803959"/>
-            <a:ext cx="1895166" cy="686259"/>
+            <a:off x="4876032" y="516390"/>
+            <a:ext cx="1066031" cy="386021"/>
           </a:xfrm>
           <a:prstGeom prst="flowChartProcess">
             <a:avLst/>
@@ -3222,24 +3174,138 @@
           <a:p>
             <a:pPr algn="ctr"/>
             <a:r>
-              <a:rPr lang="es-ES" sz="1200">
+              <a:rPr lang="es-ES" sz="675">
                 <a:solidFill>
                   <a:schemeClr val="accent6">
                     <a:lumMod val="50000"/>
                   </a:schemeClr>
                 </a:solidFill>
               </a:rPr>
-              <a:t>Función (Puede tener varios eventos dentro)</a:t>
-            </a:r>
-          </a:p>
-        </p:txBody>
-      </p:sp>
-      <p:sp>
-        <p:nvSpPr>
-          <p:cNvPr id="6" name="Diagrama de flujo: decisión 5">
+              <a:t>Al arrancar la página</a:t>
+            </a:r>
+          </a:p>
+        </p:txBody>
+      </p:sp>
+      <p:cxnSp>
+        <p:nvCxnSpPr>
+          <p:cNvPr id="32" name="Conector recto de flecha 31">
             <a:extLst>
               <a:ext uri="{FF2B5EF4-FFF2-40B4-BE49-F238E27FC236}">
-                <a16:creationId xmlns:a16="http://schemas.microsoft.com/office/drawing/2014/main" id="{E3E52E6D-7962-41C7-8D1B-4BB3E7A850C7}"/>
+                <a16:creationId xmlns:a16="http://schemas.microsoft.com/office/drawing/2014/main" id="{D049F65C-22F4-44BA-B152-B3F22CEEDA6B}"/>
+              </a:ext>
+            </a:extLst>
+          </p:cNvPr>
+          <p:cNvCxnSpPr>
+            <a:cxnSpLocks/>
+            <a:stCxn id="18" idx="2"/>
+          </p:cNvCxnSpPr>
+          <p:nvPr/>
+        </p:nvCxnSpPr>
+        <p:spPr>
+          <a:xfrm>
+            <a:off x="5409048" y="902411"/>
+            <a:ext cx="0" cy="267318"/>
+          </a:xfrm>
+          <a:prstGeom prst="straightConnector1">
+            <a:avLst/>
+          </a:prstGeom>
+          <a:ln>
+            <a:tailEnd type="triangle"/>
+          </a:ln>
+        </p:spPr>
+        <p:style>
+          <a:lnRef idx="1">
+            <a:schemeClr val="dk1"/>
+          </a:lnRef>
+          <a:fillRef idx="0">
+            <a:schemeClr val="dk1"/>
+          </a:fillRef>
+          <a:effectRef idx="0">
+            <a:schemeClr val="dk1"/>
+          </a:effectRef>
+          <a:fontRef idx="minor">
+            <a:schemeClr val="tx1"/>
+          </a:fontRef>
+        </p:style>
+      </p:cxnSp>
+      <p:sp>
+        <p:nvSpPr>
+          <p:cNvPr id="50" name="CuadroTexto 49">
+            <a:extLst>
+              <a:ext uri="{FF2B5EF4-FFF2-40B4-BE49-F238E27FC236}">
+                <a16:creationId xmlns:a16="http://schemas.microsoft.com/office/drawing/2014/main" id="{48D0C5EE-1026-4D33-9B79-A2BB09D159FB}"/>
+              </a:ext>
+            </a:extLst>
+          </p:cNvPr>
+          <p:cNvSpPr txBox="1"/>
+          <p:nvPr/>
+        </p:nvSpPr>
+        <p:spPr>
+          <a:xfrm>
+            <a:off x="4373645" y="1814063"/>
+            <a:ext cx="430614" cy="196208"/>
+          </a:xfrm>
+          <a:prstGeom prst="rect">
+            <a:avLst/>
+          </a:prstGeom>
+          <a:noFill/>
+        </p:spPr>
+        <p:txBody>
+          <a:bodyPr wrap="square" rtlCol="0">
+            <a:spAutoFit/>
+          </a:bodyPr>
+          <a:lstStyle/>
+          <a:p>
+            <a:pPr algn="ctr"/>
+            <a:r>
+              <a:rPr lang="es-ES" sz="675" b="1"/>
+              <a:t>NO</a:t>
+            </a:r>
+          </a:p>
+        </p:txBody>
+      </p:sp>
+      <p:sp>
+        <p:nvSpPr>
+          <p:cNvPr id="55" name="CuadroTexto 54">
+            <a:extLst>
+              <a:ext uri="{FF2B5EF4-FFF2-40B4-BE49-F238E27FC236}">
+                <a16:creationId xmlns:a16="http://schemas.microsoft.com/office/drawing/2014/main" id="{FBBA36EA-69CC-4211-B96C-E82963FF86BC}"/>
+              </a:ext>
+            </a:extLst>
+          </p:cNvPr>
+          <p:cNvSpPr txBox="1"/>
+          <p:nvPr/>
+        </p:nvSpPr>
+        <p:spPr>
+          <a:xfrm>
+            <a:off x="6018573" y="1787774"/>
+            <a:ext cx="290332" cy="196208"/>
+          </a:xfrm>
+          <a:prstGeom prst="rect">
+            <a:avLst/>
+          </a:prstGeom>
+          <a:noFill/>
+        </p:spPr>
+        <p:txBody>
+          <a:bodyPr wrap="square" rtlCol="0">
+            <a:spAutoFit/>
+          </a:bodyPr>
+          <a:lstStyle/>
+          <a:p>
+            <a:pPr algn="ctr"/>
+            <a:r>
+              <a:rPr lang="es-ES" sz="675" b="1"/>
+              <a:t>SI</a:t>
+            </a:r>
+          </a:p>
+        </p:txBody>
+      </p:sp>
+      <p:sp>
+        <p:nvSpPr>
+          <p:cNvPr id="64" name="Diagrama de flujo: proceso 63">
+            <a:extLst>
+              <a:ext uri="{FF2B5EF4-FFF2-40B4-BE49-F238E27FC236}">
+                <a16:creationId xmlns:a16="http://schemas.microsoft.com/office/drawing/2014/main" id="{B65F5A48-83DC-4947-BFA5-D36C8913F35F}"/>
               </a:ext>
             </a:extLst>
           </p:cNvPr>
@@ -3248,8 +3314,1196 @@
         </p:nvSpPr>
         <p:spPr>
           <a:xfrm>
-            <a:off x="3628823" y="8649180"/>
-            <a:ext cx="2286096" cy="1015564"/>
+            <a:off x="4876032" y="1169729"/>
+            <a:ext cx="1066031" cy="386021"/>
+          </a:xfrm>
+          <a:prstGeom prst="flowChartProcess">
+            <a:avLst/>
+          </a:prstGeom>
+          <a:solidFill>
+            <a:schemeClr val="bg1"/>
+          </a:solidFill>
+          <a:ln>
+            <a:solidFill>
+              <a:schemeClr val="accent6">
+                <a:lumMod val="75000"/>
+              </a:schemeClr>
+            </a:solidFill>
+          </a:ln>
+          <a:effectLst>
+            <a:outerShdw blurRad="50800" dist="38100" dir="2700000" algn="tl" rotWithShape="0">
+              <a:prstClr val="black">
+                <a:alpha val="40000"/>
+              </a:prstClr>
+            </a:outerShdw>
+          </a:effectLst>
+        </p:spPr>
+        <p:style>
+          <a:lnRef idx="2">
+            <a:schemeClr val="accent1">
+              <a:shade val="50000"/>
+            </a:schemeClr>
+          </a:lnRef>
+          <a:fillRef idx="1">
+            <a:schemeClr val="accent1"/>
+          </a:fillRef>
+          <a:effectRef idx="0">
+            <a:schemeClr val="accent1"/>
+          </a:effectRef>
+          <a:fontRef idx="minor">
+            <a:schemeClr val="lt1"/>
+          </a:fontRef>
+        </p:style>
+        <p:txBody>
+          <a:bodyPr rtlCol="0" anchor="ctr"/>
+          <a:lstStyle/>
+          <a:p>
+            <a:pPr algn="ctr"/>
+            <a:r>
+              <a:rPr lang="es-ES" sz="675">
+                <a:solidFill>
+                  <a:schemeClr val="accent6">
+                    <a:lumMod val="50000"/>
+                  </a:schemeClr>
+                </a:solidFill>
+              </a:rPr>
+              <a:t>Solicito los datos a la API y los limpio</a:t>
+            </a:r>
+          </a:p>
+        </p:txBody>
+      </p:sp>
+      <p:sp>
+        <p:nvSpPr>
+          <p:cNvPr id="68" name="Diagrama de flujo: proceso 67">
+            <a:extLst>
+              <a:ext uri="{FF2B5EF4-FFF2-40B4-BE49-F238E27FC236}">
+                <a16:creationId xmlns:a16="http://schemas.microsoft.com/office/drawing/2014/main" id="{4E2954F5-DC13-45D4-983F-109261152963}"/>
+              </a:ext>
+            </a:extLst>
+          </p:cNvPr>
+          <p:cNvSpPr/>
+          <p:nvPr/>
+        </p:nvSpPr>
+        <p:spPr>
+          <a:xfrm>
+            <a:off x="4872624" y="3279211"/>
+            <a:ext cx="1066031" cy="386021"/>
+          </a:xfrm>
+          <a:prstGeom prst="flowChartProcess">
+            <a:avLst/>
+          </a:prstGeom>
+          <a:solidFill>
+            <a:schemeClr val="bg1"/>
+          </a:solidFill>
+          <a:ln>
+            <a:solidFill>
+              <a:schemeClr val="accent6">
+                <a:lumMod val="75000"/>
+              </a:schemeClr>
+            </a:solidFill>
+          </a:ln>
+          <a:effectLst>
+            <a:outerShdw blurRad="50800" dist="38100" dir="2700000" algn="tl" rotWithShape="0">
+              <a:prstClr val="black">
+                <a:alpha val="40000"/>
+              </a:prstClr>
+            </a:outerShdw>
+          </a:effectLst>
+        </p:spPr>
+        <p:style>
+          <a:lnRef idx="2">
+            <a:schemeClr val="accent1">
+              <a:shade val="50000"/>
+            </a:schemeClr>
+          </a:lnRef>
+          <a:fillRef idx="1">
+            <a:schemeClr val="accent1"/>
+          </a:fillRef>
+          <a:effectRef idx="0">
+            <a:schemeClr val="accent1"/>
+          </a:effectRef>
+          <a:fontRef idx="minor">
+            <a:schemeClr val="lt1"/>
+          </a:fontRef>
+        </p:style>
+        <p:txBody>
+          <a:bodyPr rtlCol="0" anchor="ctr"/>
+          <a:lstStyle/>
+          <a:p>
+            <a:pPr algn="ctr"/>
+            <a:r>
+              <a:rPr lang="es-ES" sz="675">
+                <a:solidFill>
+                  <a:schemeClr val="accent6">
+                    <a:lumMod val="50000"/>
+                  </a:schemeClr>
+                </a:solidFill>
+              </a:rPr>
+              <a:t>Guardo en una variable GLOBAL los datos - </a:t>
+            </a:r>
+            <a:r>
+              <a:rPr lang="es-ES" sz="675" b="1">
+                <a:solidFill>
+                  <a:srgbClr val="FF0000"/>
+                </a:solidFill>
+              </a:rPr>
+              <a:t>movies</a:t>
+            </a:r>
+          </a:p>
+        </p:txBody>
+      </p:sp>
+      <p:sp>
+        <p:nvSpPr>
+          <p:cNvPr id="17" name="Diagrama de flujo: proceso 16">
+            <a:extLst>
+              <a:ext uri="{FF2B5EF4-FFF2-40B4-BE49-F238E27FC236}">
+                <a16:creationId xmlns:a16="http://schemas.microsoft.com/office/drawing/2014/main" id="{F8401453-5803-437C-98DF-3035744CA45F}"/>
+              </a:ext>
+            </a:extLst>
+          </p:cNvPr>
+          <p:cNvSpPr/>
+          <p:nvPr/>
+        </p:nvSpPr>
+        <p:spPr>
+          <a:xfrm>
+            <a:off x="2471073" y="1335688"/>
+            <a:ext cx="1066031" cy="386021"/>
+          </a:xfrm>
+          <a:prstGeom prst="flowChartProcess">
+            <a:avLst/>
+          </a:prstGeom>
+          <a:solidFill>
+            <a:schemeClr val="bg1"/>
+          </a:solidFill>
+          <a:ln>
+            <a:solidFill>
+              <a:schemeClr val="accent6">
+                <a:lumMod val="75000"/>
+              </a:schemeClr>
+            </a:solidFill>
+          </a:ln>
+          <a:effectLst>
+            <a:outerShdw blurRad="50800" dist="38100" dir="2700000" algn="tl" rotWithShape="0">
+              <a:prstClr val="black">
+                <a:alpha val="40000"/>
+              </a:prstClr>
+            </a:outerShdw>
+          </a:effectLst>
+        </p:spPr>
+        <p:style>
+          <a:lnRef idx="2">
+            <a:schemeClr val="accent1">
+              <a:shade val="50000"/>
+            </a:schemeClr>
+          </a:lnRef>
+          <a:fillRef idx="1">
+            <a:schemeClr val="accent1"/>
+          </a:fillRef>
+          <a:effectRef idx="0">
+            <a:schemeClr val="accent1"/>
+          </a:effectRef>
+          <a:fontRef idx="minor">
+            <a:schemeClr val="lt1"/>
+          </a:fontRef>
+        </p:style>
+        <p:txBody>
+          <a:bodyPr rtlCol="0" anchor="ctr"/>
+          <a:lstStyle/>
+          <a:p>
+            <a:pPr algn="ctr"/>
+            <a:r>
+              <a:rPr lang="es-ES" sz="675">
+                <a:solidFill>
+                  <a:schemeClr val="accent6">
+                    <a:lumMod val="50000"/>
+                  </a:schemeClr>
+                </a:solidFill>
+              </a:rPr>
+              <a:t>Guardo en una variable el texto buscado</a:t>
+            </a:r>
+          </a:p>
+        </p:txBody>
+      </p:sp>
+      <p:sp>
+        <p:nvSpPr>
+          <p:cNvPr id="2" name="Rectángulo 1">
+            <a:extLst>
+              <a:ext uri="{FF2B5EF4-FFF2-40B4-BE49-F238E27FC236}">
+                <a16:creationId xmlns:a16="http://schemas.microsoft.com/office/drawing/2014/main" id="{29BEAFBC-5500-458A-A0E2-8800E9D7C46D}"/>
+              </a:ext>
+            </a:extLst>
+          </p:cNvPr>
+          <p:cNvSpPr/>
+          <p:nvPr/>
+        </p:nvSpPr>
+        <p:spPr>
+          <a:xfrm>
+            <a:off x="350121" y="4121675"/>
+            <a:ext cx="11553857" cy="2225969"/>
+          </a:xfrm>
+          <a:prstGeom prst="rect">
+            <a:avLst/>
+          </a:prstGeom>
+          <a:solidFill>
+            <a:schemeClr val="accent6">
+              <a:lumMod val="20000"/>
+              <a:lumOff val="80000"/>
+            </a:schemeClr>
+          </a:solidFill>
+          <a:ln w="3175"/>
+        </p:spPr>
+        <p:style>
+          <a:lnRef idx="2">
+            <a:schemeClr val="accent6">
+              <a:shade val="50000"/>
+            </a:schemeClr>
+          </a:lnRef>
+          <a:fillRef idx="1">
+            <a:schemeClr val="accent6"/>
+          </a:fillRef>
+          <a:effectRef idx="0">
+            <a:schemeClr val="accent6"/>
+          </a:effectRef>
+          <a:fontRef idx="minor">
+            <a:schemeClr val="lt1"/>
+          </a:fontRef>
+        </p:style>
+        <p:txBody>
+          <a:bodyPr rtlCol="0" anchor="ctr"/>
+          <a:lstStyle/>
+          <a:p>
+            <a:pPr algn="ctr"/>
+            <a:endParaRPr lang="es-ES"/>
+          </a:p>
+        </p:txBody>
+      </p:sp>
+      <p:sp>
+        <p:nvSpPr>
+          <p:cNvPr id="19" name="Diagrama de flujo: proceso 18">
+            <a:extLst>
+              <a:ext uri="{FF2B5EF4-FFF2-40B4-BE49-F238E27FC236}">
+                <a16:creationId xmlns:a16="http://schemas.microsoft.com/office/drawing/2014/main" id="{B0918AD6-58C0-43BE-88C0-0EE467C9B287}"/>
+              </a:ext>
+            </a:extLst>
+          </p:cNvPr>
+          <p:cNvSpPr/>
+          <p:nvPr/>
+        </p:nvSpPr>
+        <p:spPr>
+          <a:xfrm>
+            <a:off x="2471073" y="4380551"/>
+            <a:ext cx="1066031" cy="386021"/>
+          </a:xfrm>
+          <a:prstGeom prst="flowChartProcess">
+            <a:avLst/>
+          </a:prstGeom>
+          <a:solidFill>
+            <a:schemeClr val="bg1"/>
+          </a:solidFill>
+          <a:ln>
+            <a:solidFill>
+              <a:schemeClr val="accent6">
+                <a:lumMod val="75000"/>
+              </a:schemeClr>
+            </a:solidFill>
+          </a:ln>
+          <a:effectLst>
+            <a:outerShdw blurRad="50800" dist="38100" dir="2700000" algn="tl" rotWithShape="0">
+              <a:prstClr val="black">
+                <a:alpha val="40000"/>
+              </a:prstClr>
+            </a:outerShdw>
+          </a:effectLst>
+        </p:spPr>
+        <p:style>
+          <a:lnRef idx="2">
+            <a:schemeClr val="accent1">
+              <a:shade val="50000"/>
+            </a:schemeClr>
+          </a:lnRef>
+          <a:fillRef idx="1">
+            <a:schemeClr val="accent1"/>
+          </a:fillRef>
+          <a:effectRef idx="0">
+            <a:schemeClr val="accent1"/>
+          </a:effectRef>
+          <a:fontRef idx="minor">
+            <a:schemeClr val="lt1"/>
+          </a:fontRef>
+        </p:style>
+        <p:txBody>
+          <a:bodyPr rtlCol="0" anchor="ctr"/>
+          <a:lstStyle/>
+          <a:p>
+            <a:pPr algn="ctr"/>
+            <a:r>
+              <a:rPr lang="es-ES" sz="675">
+                <a:solidFill>
+                  <a:schemeClr val="accent6">
+                    <a:lumMod val="50000"/>
+                  </a:schemeClr>
+                </a:solidFill>
+              </a:rPr>
+              <a:t>Pinto las películas de la búsqueda</a:t>
+            </a:r>
+          </a:p>
+        </p:txBody>
+      </p:sp>
+      <p:sp>
+        <p:nvSpPr>
+          <p:cNvPr id="20" name="CuadroTexto 19">
+            <a:extLst>
+              <a:ext uri="{FF2B5EF4-FFF2-40B4-BE49-F238E27FC236}">
+                <a16:creationId xmlns:a16="http://schemas.microsoft.com/office/drawing/2014/main" id="{CF4084D2-B488-4700-857C-E0F506721EEF}"/>
+              </a:ext>
+            </a:extLst>
+          </p:cNvPr>
+          <p:cNvSpPr txBox="1"/>
+          <p:nvPr/>
+        </p:nvSpPr>
+        <p:spPr>
+          <a:xfrm>
+            <a:off x="282929" y="6031912"/>
+            <a:ext cx="2580433" cy="248209"/>
+          </a:xfrm>
+          <a:prstGeom prst="rect">
+            <a:avLst/>
+          </a:prstGeom>
+          <a:noFill/>
+        </p:spPr>
+        <p:txBody>
+          <a:bodyPr wrap="square" rtlCol="0">
+            <a:spAutoFit/>
+          </a:bodyPr>
+          <a:lstStyle/>
+          <a:p>
+            <a:r>
+              <a:rPr lang="es-ES" sz="1013" b="1"/>
+              <a:t>Estas funciones NO MODIFICAN DATOS</a:t>
+            </a:r>
+          </a:p>
+        </p:txBody>
+      </p:sp>
+      <p:sp>
+        <p:nvSpPr>
+          <p:cNvPr id="22" name="CuadroTexto 21">
+            <a:extLst>
+              <a:ext uri="{FF2B5EF4-FFF2-40B4-BE49-F238E27FC236}">
+                <a16:creationId xmlns:a16="http://schemas.microsoft.com/office/drawing/2014/main" id="{A9D9D6C8-82FB-4119-B730-CDF8637745E7}"/>
+              </a:ext>
+            </a:extLst>
+          </p:cNvPr>
+          <p:cNvSpPr txBox="1"/>
+          <p:nvPr/>
+        </p:nvSpPr>
+        <p:spPr>
+          <a:xfrm>
+            <a:off x="369962" y="1080198"/>
+            <a:ext cx="2045029" cy="248209"/>
+          </a:xfrm>
+          <a:prstGeom prst="rect">
+            <a:avLst/>
+          </a:prstGeom>
+          <a:noFill/>
+        </p:spPr>
+        <p:txBody>
+          <a:bodyPr wrap="square" rtlCol="0">
+            <a:spAutoFit/>
+          </a:bodyPr>
+          <a:lstStyle/>
+          <a:p>
+            <a:r>
+              <a:rPr lang="es-ES" sz="1013" b="1"/>
+              <a:t>Estas funciones NO DEBEN PINTAR</a:t>
+            </a:r>
+          </a:p>
+        </p:txBody>
+      </p:sp>
+      <p:sp>
+        <p:nvSpPr>
+          <p:cNvPr id="23" name="Diagrama de flujo: proceso 22">
+            <a:extLst>
+              <a:ext uri="{FF2B5EF4-FFF2-40B4-BE49-F238E27FC236}">
+                <a16:creationId xmlns:a16="http://schemas.microsoft.com/office/drawing/2014/main" id="{3DCB76D9-122D-46AE-AA52-BC64B7586BDC}"/>
+              </a:ext>
+            </a:extLst>
+          </p:cNvPr>
+          <p:cNvSpPr/>
+          <p:nvPr/>
+        </p:nvSpPr>
+        <p:spPr>
+          <a:xfrm>
+            <a:off x="2471073" y="5152713"/>
+            <a:ext cx="1066031" cy="386021"/>
+          </a:xfrm>
+          <a:prstGeom prst="flowChartProcess">
+            <a:avLst/>
+          </a:prstGeom>
+          <a:solidFill>
+            <a:schemeClr val="bg1"/>
+          </a:solidFill>
+          <a:ln>
+            <a:solidFill>
+              <a:schemeClr val="accent6">
+                <a:lumMod val="75000"/>
+              </a:schemeClr>
+            </a:solidFill>
+          </a:ln>
+          <a:effectLst>
+            <a:outerShdw blurRad="50800" dist="38100" dir="2700000" algn="tl" rotWithShape="0">
+              <a:prstClr val="black">
+                <a:alpha val="40000"/>
+              </a:prstClr>
+            </a:outerShdw>
+          </a:effectLst>
+        </p:spPr>
+        <p:style>
+          <a:lnRef idx="2">
+            <a:schemeClr val="accent1">
+              <a:shade val="50000"/>
+            </a:schemeClr>
+          </a:lnRef>
+          <a:fillRef idx="1">
+            <a:schemeClr val="accent1"/>
+          </a:fillRef>
+          <a:effectRef idx="0">
+            <a:schemeClr val="accent1"/>
+          </a:effectRef>
+          <a:fontRef idx="minor">
+            <a:schemeClr val="lt1"/>
+          </a:fontRef>
+        </p:style>
+        <p:txBody>
+          <a:bodyPr rtlCol="0" anchor="ctr"/>
+          <a:lstStyle/>
+          <a:p>
+            <a:pPr algn="ctr"/>
+            <a:r>
+              <a:rPr lang="es-ES" sz="675">
+                <a:solidFill>
+                  <a:schemeClr val="accent6">
+                    <a:lumMod val="50000"/>
+                  </a:schemeClr>
+                </a:solidFill>
+              </a:rPr>
+              <a:t>Escucho eventos en las películas de la búsqueda</a:t>
+            </a:r>
+          </a:p>
+        </p:txBody>
+      </p:sp>
+      <p:sp>
+        <p:nvSpPr>
+          <p:cNvPr id="24" name="Diagrama de flujo: proceso 23">
+            <a:extLst>
+              <a:ext uri="{FF2B5EF4-FFF2-40B4-BE49-F238E27FC236}">
+                <a16:creationId xmlns:a16="http://schemas.microsoft.com/office/drawing/2014/main" id="{B0B8D4B3-E6BA-4C17-B285-C24523CCABC0}"/>
+              </a:ext>
+            </a:extLst>
+          </p:cNvPr>
+          <p:cNvSpPr/>
+          <p:nvPr/>
+        </p:nvSpPr>
+        <p:spPr>
+          <a:xfrm>
+            <a:off x="6374638" y="4359459"/>
+            <a:ext cx="1066031" cy="386021"/>
+          </a:xfrm>
+          <a:prstGeom prst="flowChartProcess">
+            <a:avLst/>
+          </a:prstGeom>
+          <a:solidFill>
+            <a:schemeClr val="bg1"/>
+          </a:solidFill>
+          <a:ln>
+            <a:solidFill>
+              <a:schemeClr val="accent6">
+                <a:lumMod val="75000"/>
+              </a:schemeClr>
+            </a:solidFill>
+          </a:ln>
+          <a:effectLst>
+            <a:outerShdw blurRad="50800" dist="38100" dir="2700000" algn="tl" rotWithShape="0">
+              <a:prstClr val="black">
+                <a:alpha val="40000"/>
+              </a:prstClr>
+            </a:outerShdw>
+          </a:effectLst>
+        </p:spPr>
+        <p:style>
+          <a:lnRef idx="2">
+            <a:schemeClr val="accent1">
+              <a:shade val="50000"/>
+            </a:schemeClr>
+          </a:lnRef>
+          <a:fillRef idx="1">
+            <a:schemeClr val="accent1"/>
+          </a:fillRef>
+          <a:effectRef idx="0">
+            <a:schemeClr val="accent1"/>
+          </a:effectRef>
+          <a:fontRef idx="minor">
+            <a:schemeClr val="lt1"/>
+          </a:fontRef>
+        </p:style>
+        <p:txBody>
+          <a:bodyPr rtlCol="0" anchor="ctr"/>
+          <a:lstStyle/>
+          <a:p>
+            <a:pPr algn="ctr"/>
+            <a:r>
+              <a:rPr lang="es-ES" sz="675">
+                <a:solidFill>
+                  <a:schemeClr val="accent6">
+                    <a:lumMod val="50000"/>
+                  </a:schemeClr>
+                </a:solidFill>
+              </a:rPr>
+              <a:t>Pinto las películas favoritas</a:t>
+            </a:r>
+          </a:p>
+        </p:txBody>
+      </p:sp>
+      <p:sp>
+        <p:nvSpPr>
+          <p:cNvPr id="25" name="Diagrama de flujo: proceso 24">
+            <a:extLst>
+              <a:ext uri="{FF2B5EF4-FFF2-40B4-BE49-F238E27FC236}">
+                <a16:creationId xmlns:a16="http://schemas.microsoft.com/office/drawing/2014/main" id="{237CC9CA-B369-4EC9-942D-A4F19852B5C5}"/>
+              </a:ext>
+            </a:extLst>
+          </p:cNvPr>
+          <p:cNvSpPr/>
+          <p:nvPr/>
+        </p:nvSpPr>
+        <p:spPr>
+          <a:xfrm>
+            <a:off x="6374638" y="5152713"/>
+            <a:ext cx="1066031" cy="386021"/>
+          </a:xfrm>
+          <a:prstGeom prst="flowChartProcess">
+            <a:avLst/>
+          </a:prstGeom>
+          <a:solidFill>
+            <a:schemeClr val="bg1"/>
+          </a:solidFill>
+          <a:ln>
+            <a:solidFill>
+              <a:schemeClr val="accent6">
+                <a:lumMod val="75000"/>
+              </a:schemeClr>
+            </a:solidFill>
+          </a:ln>
+          <a:effectLst>
+            <a:outerShdw blurRad="50800" dist="38100" dir="2700000" algn="tl" rotWithShape="0">
+              <a:prstClr val="black">
+                <a:alpha val="40000"/>
+              </a:prstClr>
+            </a:outerShdw>
+          </a:effectLst>
+        </p:spPr>
+        <p:style>
+          <a:lnRef idx="2">
+            <a:schemeClr val="accent1">
+              <a:shade val="50000"/>
+            </a:schemeClr>
+          </a:lnRef>
+          <a:fillRef idx="1">
+            <a:schemeClr val="accent1"/>
+          </a:fillRef>
+          <a:effectRef idx="0">
+            <a:schemeClr val="accent1"/>
+          </a:effectRef>
+          <a:fontRef idx="minor">
+            <a:schemeClr val="lt1"/>
+          </a:fontRef>
+        </p:style>
+        <p:txBody>
+          <a:bodyPr rtlCol="0" anchor="ctr"/>
+          <a:lstStyle/>
+          <a:p>
+            <a:pPr algn="ctr"/>
+            <a:r>
+              <a:rPr lang="es-ES" sz="675">
+                <a:solidFill>
+                  <a:schemeClr val="accent6">
+                    <a:lumMod val="50000"/>
+                  </a:schemeClr>
+                </a:solidFill>
+              </a:rPr>
+              <a:t>Escucho eventos en las películas favoritas</a:t>
+            </a:r>
+          </a:p>
+        </p:txBody>
+      </p:sp>
+      <p:cxnSp>
+        <p:nvCxnSpPr>
+          <p:cNvPr id="26" name="Conector recto de flecha 25">
+            <a:extLst>
+              <a:ext uri="{FF2B5EF4-FFF2-40B4-BE49-F238E27FC236}">
+                <a16:creationId xmlns:a16="http://schemas.microsoft.com/office/drawing/2014/main" id="{62D59887-5FF0-4B8B-913E-9D03905AFF8E}"/>
+              </a:ext>
+            </a:extLst>
+          </p:cNvPr>
+          <p:cNvCxnSpPr>
+            <a:cxnSpLocks/>
+            <a:stCxn id="24" idx="2"/>
+            <a:endCxn id="25" idx="0"/>
+          </p:cNvCxnSpPr>
+          <p:nvPr/>
+        </p:nvCxnSpPr>
+        <p:spPr>
+          <a:xfrm>
+            <a:off x="6907654" y="4745480"/>
+            <a:ext cx="0" cy="407233"/>
+          </a:xfrm>
+          <a:prstGeom prst="straightConnector1">
+            <a:avLst/>
+          </a:prstGeom>
+          <a:ln>
+            <a:tailEnd type="triangle"/>
+          </a:ln>
+        </p:spPr>
+        <p:style>
+          <a:lnRef idx="1">
+            <a:schemeClr val="dk1"/>
+          </a:lnRef>
+          <a:fillRef idx="0">
+            <a:schemeClr val="dk1"/>
+          </a:fillRef>
+          <a:effectRef idx="0">
+            <a:schemeClr val="dk1"/>
+          </a:effectRef>
+          <a:fontRef idx="minor">
+            <a:schemeClr val="tx1"/>
+          </a:fontRef>
+        </p:style>
+      </p:cxnSp>
+      <p:cxnSp>
+        <p:nvCxnSpPr>
+          <p:cNvPr id="29" name="Conector recto de flecha 28">
+            <a:extLst>
+              <a:ext uri="{FF2B5EF4-FFF2-40B4-BE49-F238E27FC236}">
+                <a16:creationId xmlns:a16="http://schemas.microsoft.com/office/drawing/2014/main" id="{4B66560D-33CE-4939-B596-8589496C1E62}"/>
+              </a:ext>
+            </a:extLst>
+          </p:cNvPr>
+          <p:cNvCxnSpPr>
+            <a:cxnSpLocks/>
+            <a:stCxn id="19" idx="2"/>
+            <a:endCxn id="23" idx="0"/>
+          </p:cNvCxnSpPr>
+          <p:nvPr/>
+        </p:nvCxnSpPr>
+        <p:spPr>
+          <a:xfrm>
+            <a:off x="3004089" y="4766572"/>
+            <a:ext cx="0" cy="386141"/>
+          </a:xfrm>
+          <a:prstGeom prst="straightConnector1">
+            <a:avLst/>
+          </a:prstGeom>
+          <a:ln>
+            <a:tailEnd type="triangle"/>
+          </a:ln>
+        </p:spPr>
+        <p:style>
+          <a:lnRef idx="1">
+            <a:schemeClr val="dk1"/>
+          </a:lnRef>
+          <a:fillRef idx="0">
+            <a:schemeClr val="dk1"/>
+          </a:fillRef>
+          <a:effectRef idx="0">
+            <a:schemeClr val="dk1"/>
+          </a:effectRef>
+          <a:fontRef idx="minor">
+            <a:schemeClr val="tx1"/>
+          </a:fontRef>
+        </p:style>
+      </p:cxnSp>
+      <p:sp>
+        <p:nvSpPr>
+          <p:cNvPr id="34" name="Diagrama de flujo: proceso 33">
+            <a:extLst>
+              <a:ext uri="{FF2B5EF4-FFF2-40B4-BE49-F238E27FC236}">
+                <a16:creationId xmlns:a16="http://schemas.microsoft.com/office/drawing/2014/main" id="{89A59766-D286-4012-8435-CCA4DA439DB6}"/>
+              </a:ext>
+            </a:extLst>
+          </p:cNvPr>
+          <p:cNvSpPr/>
+          <p:nvPr/>
+        </p:nvSpPr>
+        <p:spPr>
+          <a:xfrm>
+            <a:off x="2471073" y="512133"/>
+            <a:ext cx="1066031" cy="386021"/>
+          </a:xfrm>
+          <a:prstGeom prst="flowChartProcess">
+            <a:avLst/>
+          </a:prstGeom>
+          <a:solidFill>
+            <a:schemeClr val="bg1"/>
+          </a:solidFill>
+          <a:ln>
+            <a:solidFill>
+              <a:schemeClr val="accent6">
+                <a:lumMod val="75000"/>
+              </a:schemeClr>
+            </a:solidFill>
+          </a:ln>
+          <a:effectLst>
+            <a:outerShdw blurRad="50800" dist="38100" dir="2700000" algn="tl" rotWithShape="0">
+              <a:prstClr val="black">
+                <a:alpha val="40000"/>
+              </a:prstClr>
+            </a:outerShdw>
+          </a:effectLst>
+        </p:spPr>
+        <p:style>
+          <a:lnRef idx="2">
+            <a:schemeClr val="accent1">
+              <a:shade val="50000"/>
+            </a:schemeClr>
+          </a:lnRef>
+          <a:fillRef idx="1">
+            <a:schemeClr val="accent1"/>
+          </a:fillRef>
+          <a:effectRef idx="0">
+            <a:schemeClr val="accent1"/>
+          </a:effectRef>
+          <a:fontRef idx="minor">
+            <a:schemeClr val="lt1"/>
+          </a:fontRef>
+        </p:style>
+        <p:txBody>
+          <a:bodyPr rtlCol="0" anchor="ctr"/>
+          <a:lstStyle/>
+          <a:p>
+            <a:pPr algn="ctr"/>
+            <a:r>
+              <a:rPr lang="es-ES" sz="675">
+                <a:solidFill>
+                  <a:schemeClr val="accent6">
+                    <a:lumMod val="50000"/>
+                  </a:schemeClr>
+                </a:solidFill>
+              </a:rPr>
+              <a:t>Click en buscar</a:t>
+            </a:r>
+          </a:p>
+        </p:txBody>
+      </p:sp>
+      <p:cxnSp>
+        <p:nvCxnSpPr>
+          <p:cNvPr id="35" name="Conector recto de flecha 34">
+            <a:extLst>
+              <a:ext uri="{FF2B5EF4-FFF2-40B4-BE49-F238E27FC236}">
+                <a16:creationId xmlns:a16="http://schemas.microsoft.com/office/drawing/2014/main" id="{CEAABC17-90A8-418A-9ABB-CE0A8FD4535A}"/>
+              </a:ext>
+            </a:extLst>
+          </p:cNvPr>
+          <p:cNvCxnSpPr>
+            <a:cxnSpLocks/>
+            <a:stCxn id="34" idx="2"/>
+            <a:endCxn id="17" idx="0"/>
+          </p:cNvCxnSpPr>
+          <p:nvPr/>
+        </p:nvCxnSpPr>
+        <p:spPr>
+          <a:xfrm>
+            <a:off x="3004089" y="898154"/>
+            <a:ext cx="0" cy="437534"/>
+          </a:xfrm>
+          <a:prstGeom prst="straightConnector1">
+            <a:avLst/>
+          </a:prstGeom>
+          <a:ln>
+            <a:tailEnd type="triangle"/>
+          </a:ln>
+        </p:spPr>
+        <p:style>
+          <a:lnRef idx="1">
+            <a:schemeClr val="dk1"/>
+          </a:lnRef>
+          <a:fillRef idx="0">
+            <a:schemeClr val="dk1"/>
+          </a:fillRef>
+          <a:effectRef idx="0">
+            <a:schemeClr val="dk1"/>
+          </a:effectRef>
+          <a:fontRef idx="minor">
+            <a:schemeClr val="tx1"/>
+          </a:fontRef>
+        </p:style>
+      </p:cxnSp>
+      <p:sp>
+        <p:nvSpPr>
+          <p:cNvPr id="36" name="CuadroTexto 35">
+            <a:extLst>
+              <a:ext uri="{FF2B5EF4-FFF2-40B4-BE49-F238E27FC236}">
+                <a16:creationId xmlns:a16="http://schemas.microsoft.com/office/drawing/2014/main" id="{81868DFA-33F0-4885-8532-9DD46DDA6670}"/>
+              </a:ext>
+            </a:extLst>
+          </p:cNvPr>
+          <p:cNvSpPr txBox="1"/>
+          <p:nvPr/>
+        </p:nvSpPr>
+        <p:spPr>
+          <a:xfrm>
+            <a:off x="369962" y="582914"/>
+            <a:ext cx="2580433" cy="248209"/>
+          </a:xfrm>
+          <a:prstGeom prst="rect">
+            <a:avLst/>
+          </a:prstGeom>
+          <a:noFill/>
+        </p:spPr>
+        <p:txBody>
+          <a:bodyPr wrap="square" rtlCol="0">
+            <a:spAutoFit/>
+          </a:bodyPr>
+          <a:lstStyle/>
+          <a:p>
+            <a:r>
+              <a:rPr lang="es-ES" sz="1013" b="1"/>
+              <a:t>Acciones/Eventos que inician flujo</a:t>
+            </a:r>
+          </a:p>
+        </p:txBody>
+      </p:sp>
+      <p:sp>
+        <p:nvSpPr>
+          <p:cNvPr id="37" name="Diagrama de flujo: proceso 36">
+            <a:extLst>
+              <a:ext uri="{FF2B5EF4-FFF2-40B4-BE49-F238E27FC236}">
+                <a16:creationId xmlns:a16="http://schemas.microsoft.com/office/drawing/2014/main" id="{5F8E7587-DAA4-441B-A62D-8C531B93A0C2}"/>
+              </a:ext>
+            </a:extLst>
+          </p:cNvPr>
+          <p:cNvSpPr/>
+          <p:nvPr/>
+        </p:nvSpPr>
+        <p:spPr>
+          <a:xfrm>
+            <a:off x="8107674" y="532466"/>
+            <a:ext cx="1066031" cy="386021"/>
+          </a:xfrm>
+          <a:prstGeom prst="flowChartProcess">
+            <a:avLst/>
+          </a:prstGeom>
+          <a:solidFill>
+            <a:schemeClr val="bg1"/>
+          </a:solidFill>
+          <a:ln>
+            <a:solidFill>
+              <a:schemeClr val="accent6">
+                <a:lumMod val="75000"/>
+              </a:schemeClr>
+            </a:solidFill>
+          </a:ln>
+          <a:effectLst>
+            <a:outerShdw blurRad="50800" dist="38100" dir="2700000" algn="tl" rotWithShape="0">
+              <a:prstClr val="black">
+                <a:alpha val="40000"/>
+              </a:prstClr>
+            </a:outerShdw>
+          </a:effectLst>
+        </p:spPr>
+        <p:style>
+          <a:lnRef idx="2">
+            <a:schemeClr val="accent1">
+              <a:shade val="50000"/>
+            </a:schemeClr>
+          </a:lnRef>
+          <a:fillRef idx="1">
+            <a:schemeClr val="accent1"/>
+          </a:fillRef>
+          <a:effectRef idx="0">
+            <a:schemeClr val="accent1"/>
+          </a:effectRef>
+          <a:fontRef idx="minor">
+            <a:schemeClr val="lt1"/>
+          </a:fontRef>
+        </p:style>
+        <p:txBody>
+          <a:bodyPr rtlCol="0" anchor="ctr"/>
+          <a:lstStyle/>
+          <a:p>
+            <a:pPr algn="ctr"/>
+            <a:r>
+              <a:rPr lang="es-ES" sz="675">
+                <a:solidFill>
+                  <a:schemeClr val="accent6">
+                    <a:lumMod val="50000"/>
+                  </a:schemeClr>
+                </a:solidFill>
+              </a:rPr>
+              <a:t>Click sobre una </a:t>
+            </a:r>
+            <a:r>
+              <a:rPr lang="es-ES" sz="675" b="1">
+                <a:solidFill>
+                  <a:srgbClr val="FF0000"/>
+                </a:solidFill>
+              </a:rPr>
+              <a:t>movies</a:t>
+            </a:r>
+            <a:endParaRPr lang="es-ES" sz="675">
+              <a:solidFill>
+                <a:schemeClr val="accent6">
+                  <a:lumMod val="50000"/>
+                </a:schemeClr>
+              </a:solidFill>
+            </a:endParaRPr>
+          </a:p>
+        </p:txBody>
+      </p:sp>
+      <p:cxnSp>
+        <p:nvCxnSpPr>
+          <p:cNvPr id="58" name="Conector recto de flecha 57">
+            <a:extLst>
+              <a:ext uri="{FF2B5EF4-FFF2-40B4-BE49-F238E27FC236}">
+                <a16:creationId xmlns:a16="http://schemas.microsoft.com/office/drawing/2014/main" id="{9AA8D302-4670-471E-A96F-DD4B5B3E13E8}"/>
+              </a:ext>
+            </a:extLst>
+          </p:cNvPr>
+          <p:cNvCxnSpPr>
+            <a:cxnSpLocks/>
+            <a:stCxn id="17" idx="2"/>
+            <a:endCxn id="19" idx="0"/>
+          </p:cNvCxnSpPr>
+          <p:nvPr/>
+        </p:nvCxnSpPr>
+        <p:spPr>
+          <a:xfrm>
+            <a:off x="3004089" y="1721709"/>
+            <a:ext cx="0" cy="2658842"/>
+          </a:xfrm>
+          <a:prstGeom prst="straightConnector1">
+            <a:avLst/>
+          </a:prstGeom>
+          <a:ln>
+            <a:tailEnd type="triangle"/>
+          </a:ln>
+        </p:spPr>
+        <p:style>
+          <a:lnRef idx="1">
+            <a:schemeClr val="dk1"/>
+          </a:lnRef>
+          <a:fillRef idx="0">
+            <a:schemeClr val="dk1"/>
+          </a:fillRef>
+          <a:effectRef idx="0">
+            <a:schemeClr val="dk1"/>
+          </a:effectRef>
+          <a:fontRef idx="minor">
+            <a:schemeClr val="tx1"/>
+          </a:fontRef>
+        </p:style>
+      </p:cxnSp>
+      <p:sp>
+        <p:nvSpPr>
+          <p:cNvPr id="65" name="Diagrama de flujo: proceso 64">
+            <a:extLst>
+              <a:ext uri="{FF2B5EF4-FFF2-40B4-BE49-F238E27FC236}">
+                <a16:creationId xmlns:a16="http://schemas.microsoft.com/office/drawing/2014/main" id="{7517D73B-DE66-489D-A62F-44FADBCB3E77}"/>
+              </a:ext>
+            </a:extLst>
+          </p:cNvPr>
+          <p:cNvSpPr/>
+          <p:nvPr/>
+        </p:nvSpPr>
+        <p:spPr>
+          <a:xfrm>
+            <a:off x="10755461" y="512133"/>
+            <a:ext cx="1066031" cy="386021"/>
+          </a:xfrm>
+          <a:prstGeom prst="flowChartProcess">
+            <a:avLst/>
+          </a:prstGeom>
+          <a:solidFill>
+            <a:schemeClr val="bg1"/>
+          </a:solidFill>
+          <a:ln>
+            <a:solidFill>
+              <a:schemeClr val="accent6">
+                <a:lumMod val="75000"/>
+              </a:schemeClr>
+            </a:solidFill>
+          </a:ln>
+          <a:effectLst>
+            <a:outerShdw blurRad="50800" dist="38100" dir="2700000" algn="tl" rotWithShape="0">
+              <a:prstClr val="black">
+                <a:alpha val="40000"/>
+              </a:prstClr>
+            </a:outerShdw>
+          </a:effectLst>
+        </p:spPr>
+        <p:style>
+          <a:lnRef idx="2">
+            <a:schemeClr val="accent1">
+              <a:shade val="50000"/>
+            </a:schemeClr>
+          </a:lnRef>
+          <a:fillRef idx="1">
+            <a:schemeClr val="accent1"/>
+          </a:fillRef>
+          <a:effectRef idx="0">
+            <a:schemeClr val="accent1"/>
+          </a:effectRef>
+          <a:fontRef idx="minor">
+            <a:schemeClr val="lt1"/>
+          </a:fontRef>
+        </p:style>
+        <p:txBody>
+          <a:bodyPr rtlCol="0" anchor="ctr"/>
+          <a:lstStyle/>
+          <a:p>
+            <a:pPr algn="ctr"/>
+            <a:r>
+              <a:rPr lang="es-ES" sz="675">
+                <a:solidFill>
+                  <a:schemeClr val="accent6">
+                    <a:lumMod val="50000"/>
+                  </a:schemeClr>
+                </a:solidFill>
+              </a:rPr>
+              <a:t>Click en reset de favoritos</a:t>
+            </a:r>
+          </a:p>
+        </p:txBody>
+      </p:sp>
+      <p:cxnSp>
+        <p:nvCxnSpPr>
+          <p:cNvPr id="66" name="Conector: angular 65">
+            <a:extLst>
+              <a:ext uri="{FF2B5EF4-FFF2-40B4-BE49-F238E27FC236}">
+                <a16:creationId xmlns:a16="http://schemas.microsoft.com/office/drawing/2014/main" id="{95F8F3FB-79EB-4363-A0A7-486CF1311C0E}"/>
+              </a:ext>
+            </a:extLst>
+          </p:cNvPr>
+          <p:cNvCxnSpPr>
+            <a:cxnSpLocks/>
+            <a:stCxn id="65" idx="2"/>
+            <a:endCxn id="154" idx="3"/>
+          </p:cNvCxnSpPr>
+          <p:nvPr/>
+        </p:nvCxnSpPr>
+        <p:spPr>
+          <a:xfrm rot="5400000">
+            <a:off x="10265384" y="1294307"/>
+            <a:ext cx="1419246" cy="626941"/>
+          </a:xfrm>
+          <a:prstGeom prst="bentConnector2">
+            <a:avLst/>
+          </a:prstGeom>
+          <a:ln>
+            <a:tailEnd type="triangle"/>
+          </a:ln>
+        </p:spPr>
+        <p:style>
+          <a:lnRef idx="1">
+            <a:schemeClr val="dk1"/>
+          </a:lnRef>
+          <a:fillRef idx="0">
+            <a:schemeClr val="dk1"/>
+          </a:fillRef>
+          <a:effectRef idx="0">
+            <a:schemeClr val="dk1"/>
+          </a:effectRef>
+          <a:fontRef idx="minor">
+            <a:schemeClr val="tx1"/>
+          </a:fontRef>
+        </p:style>
+      </p:cxnSp>
+      <p:sp>
+        <p:nvSpPr>
+          <p:cNvPr id="86" name="Diagrama de flujo: proceso 85">
+            <a:extLst>
+              <a:ext uri="{FF2B5EF4-FFF2-40B4-BE49-F238E27FC236}">
+                <a16:creationId xmlns:a16="http://schemas.microsoft.com/office/drawing/2014/main" id="{8BC173CF-B4E9-4FB9-9564-F7F7CD97F099}"/>
+              </a:ext>
+            </a:extLst>
+          </p:cNvPr>
+          <p:cNvSpPr/>
+          <p:nvPr/>
+        </p:nvSpPr>
+        <p:spPr>
+          <a:xfrm>
+            <a:off x="4055937" y="2194531"/>
+            <a:ext cx="1066031" cy="386021"/>
+          </a:xfrm>
+          <a:prstGeom prst="flowChartProcess">
+            <a:avLst/>
+          </a:prstGeom>
+          <a:solidFill>
+            <a:schemeClr val="bg1"/>
+          </a:solidFill>
+          <a:ln>
+            <a:solidFill>
+              <a:schemeClr val="accent6">
+                <a:lumMod val="75000"/>
+              </a:schemeClr>
+            </a:solidFill>
+          </a:ln>
+          <a:effectLst>
+            <a:outerShdw blurRad="50800" dist="38100" dir="2700000" algn="tl" rotWithShape="0">
+              <a:prstClr val="black">
+                <a:alpha val="40000"/>
+              </a:prstClr>
+            </a:outerShdw>
+          </a:effectLst>
+        </p:spPr>
+        <p:style>
+          <a:lnRef idx="2">
+            <a:schemeClr val="accent1">
+              <a:shade val="50000"/>
+            </a:schemeClr>
+          </a:lnRef>
+          <a:fillRef idx="1">
+            <a:schemeClr val="accent1"/>
+          </a:fillRef>
+          <a:effectRef idx="0">
+            <a:schemeClr val="accent1"/>
+          </a:effectRef>
+          <a:fontRef idx="minor">
+            <a:schemeClr val="lt1"/>
+          </a:fontRef>
+        </p:style>
+        <p:txBody>
+          <a:bodyPr rtlCol="0" anchor="ctr"/>
+          <a:lstStyle/>
+          <a:p>
+            <a:pPr algn="ctr"/>
+            <a:r>
+              <a:rPr lang="es-ES" sz="675">
+                <a:solidFill>
+                  <a:schemeClr val="accent6">
+                    <a:lumMod val="50000"/>
+                  </a:schemeClr>
+                </a:solidFill>
+              </a:rPr>
+              <a:t>Inserto dummy image</a:t>
+            </a:r>
+          </a:p>
+        </p:txBody>
+      </p:sp>
+      <p:sp>
+        <p:nvSpPr>
+          <p:cNvPr id="93" name="Diagrama de flujo: decisión 92">
+            <a:extLst>
+              <a:ext uri="{FF2B5EF4-FFF2-40B4-BE49-F238E27FC236}">
+                <a16:creationId xmlns:a16="http://schemas.microsoft.com/office/drawing/2014/main" id="{F049979F-E601-464A-A18A-E27D4D46EC25}"/>
+              </a:ext>
+            </a:extLst>
+          </p:cNvPr>
+          <p:cNvSpPr/>
+          <p:nvPr/>
+        </p:nvSpPr>
+        <p:spPr>
+          <a:xfrm>
+            <a:off x="4766083" y="1714428"/>
+            <a:ext cx="1285929" cy="571255"/>
           </a:xfrm>
           <a:prstGeom prst="flowChartDecision">
             <a:avLst/>
@@ -3294,24 +4548,155 @@
           <a:p>
             <a:pPr algn="ctr"/>
             <a:r>
-              <a:rPr lang="es-ES" sz="1200">
+              <a:rPr lang="es-ES" sz="675">
                 <a:solidFill>
                   <a:schemeClr val="accent6">
                     <a:lumMod val="50000"/>
                   </a:schemeClr>
                 </a:solidFill>
               </a:rPr>
-              <a:t>if</a:t>
-            </a:r>
-          </a:p>
-        </p:txBody>
-      </p:sp>
-      <p:sp>
-        <p:nvSpPr>
-          <p:cNvPr id="7" name="Diagrama de flujo: terminador 6">
+              <a:t>¿Tiene todos los elementos imagen?</a:t>
+            </a:r>
+          </a:p>
+        </p:txBody>
+      </p:sp>
+      <p:cxnSp>
+        <p:nvCxnSpPr>
+          <p:cNvPr id="99" name="Conector recto de flecha 98">
             <a:extLst>
               <a:ext uri="{FF2B5EF4-FFF2-40B4-BE49-F238E27FC236}">
-                <a16:creationId xmlns:a16="http://schemas.microsoft.com/office/drawing/2014/main" id="{0A40B301-A5A6-4E3A-9026-37C27366F7CB}"/>
+                <a16:creationId xmlns:a16="http://schemas.microsoft.com/office/drawing/2014/main" id="{18C2E759-53E2-4B31-B0E3-BDF619EB9931}"/>
+              </a:ext>
+            </a:extLst>
+          </p:cNvPr>
+          <p:cNvCxnSpPr>
+            <a:cxnSpLocks/>
+            <a:stCxn id="64" idx="2"/>
+            <a:endCxn id="93" idx="0"/>
+          </p:cNvCxnSpPr>
+          <p:nvPr/>
+        </p:nvCxnSpPr>
+        <p:spPr>
+          <a:xfrm>
+            <a:off x="5409048" y="1555750"/>
+            <a:ext cx="0" cy="158678"/>
+          </a:xfrm>
+          <a:prstGeom prst="straightConnector1">
+            <a:avLst/>
+          </a:prstGeom>
+          <a:ln>
+            <a:tailEnd type="triangle"/>
+          </a:ln>
+        </p:spPr>
+        <p:style>
+          <a:lnRef idx="1">
+            <a:schemeClr val="dk1"/>
+          </a:lnRef>
+          <a:fillRef idx="0">
+            <a:schemeClr val="dk1"/>
+          </a:fillRef>
+          <a:effectRef idx="0">
+            <a:schemeClr val="dk1"/>
+          </a:effectRef>
+          <a:fontRef idx="minor">
+            <a:schemeClr val="tx1"/>
+          </a:fontRef>
+        </p:style>
+      </p:cxnSp>
+      <p:cxnSp>
+        <p:nvCxnSpPr>
+          <p:cNvPr id="104" name="Conector: angular 103">
+            <a:extLst>
+              <a:ext uri="{FF2B5EF4-FFF2-40B4-BE49-F238E27FC236}">
+                <a16:creationId xmlns:a16="http://schemas.microsoft.com/office/drawing/2014/main" id="{14EF631E-7ECA-4B03-9F16-6CDE4538A2FF}"/>
+              </a:ext>
+            </a:extLst>
+          </p:cNvPr>
+          <p:cNvCxnSpPr>
+            <a:cxnSpLocks/>
+            <a:stCxn id="93" idx="1"/>
+            <a:endCxn id="86" idx="0"/>
+          </p:cNvCxnSpPr>
+          <p:nvPr/>
+        </p:nvCxnSpPr>
+        <p:spPr>
+          <a:xfrm rot="10800000" flipV="1">
+            <a:off x="4588953" y="2000055"/>
+            <a:ext cx="177130" cy="194475"/>
+          </a:xfrm>
+          <a:prstGeom prst="bentConnector2">
+            <a:avLst/>
+          </a:prstGeom>
+          <a:ln>
+            <a:tailEnd type="triangle"/>
+          </a:ln>
+        </p:spPr>
+        <p:style>
+          <a:lnRef idx="1">
+            <a:schemeClr val="dk1"/>
+          </a:lnRef>
+          <a:fillRef idx="0">
+            <a:schemeClr val="dk1"/>
+          </a:fillRef>
+          <a:effectRef idx="0">
+            <a:schemeClr val="dk1"/>
+          </a:effectRef>
+          <a:fontRef idx="minor">
+            <a:schemeClr val="tx1"/>
+          </a:fontRef>
+        </p:style>
+      </p:cxnSp>
+      <p:cxnSp>
+        <p:nvCxnSpPr>
+          <p:cNvPr id="122" name="Conector: angular 121">
+            <a:extLst>
+              <a:ext uri="{FF2B5EF4-FFF2-40B4-BE49-F238E27FC236}">
+                <a16:creationId xmlns:a16="http://schemas.microsoft.com/office/drawing/2014/main" id="{EF930D96-B91E-4385-9069-F4A0BCEDBD60}"/>
+              </a:ext>
+            </a:extLst>
+          </p:cNvPr>
+          <p:cNvCxnSpPr>
+            <a:cxnSpLocks/>
+            <a:stCxn id="86" idx="2"/>
+            <a:endCxn id="68" idx="0"/>
+          </p:cNvCxnSpPr>
+          <p:nvPr/>
+        </p:nvCxnSpPr>
+        <p:spPr>
+          <a:xfrm rot="16200000" flipH="1">
+            <a:off x="4647967" y="2521537"/>
+            <a:ext cx="698659" cy="816687"/>
+          </a:xfrm>
+          <a:prstGeom prst="bentConnector3">
+            <a:avLst>
+              <a:gd name="adj1" fmla="val 50000"/>
+            </a:avLst>
+          </a:prstGeom>
+          <a:ln>
+            <a:tailEnd type="triangle"/>
+          </a:ln>
+        </p:spPr>
+        <p:style>
+          <a:lnRef idx="1">
+            <a:schemeClr val="dk1"/>
+          </a:lnRef>
+          <a:fillRef idx="0">
+            <a:schemeClr val="dk1"/>
+          </a:fillRef>
+          <a:effectRef idx="0">
+            <a:schemeClr val="dk1"/>
+          </a:effectRef>
+          <a:fontRef idx="minor">
+            <a:schemeClr val="tx1"/>
+          </a:fontRef>
+        </p:style>
+      </p:cxnSp>
+      <p:sp>
+        <p:nvSpPr>
+          <p:cNvPr id="129" name="Diagrama de flujo: proceso 128">
+            <a:extLst>
+              <a:ext uri="{FF2B5EF4-FFF2-40B4-BE49-F238E27FC236}">
+                <a16:creationId xmlns:a16="http://schemas.microsoft.com/office/drawing/2014/main" id="{D0997573-2F50-4658-885C-34A1674D7717}"/>
               </a:ext>
             </a:extLst>
           </p:cNvPr>
@@ -3320,139 +4705,8 @@
         </p:nvSpPr>
         <p:spPr>
           <a:xfrm>
-            <a:off x="682880" y="10106244"/>
-            <a:ext cx="2286096" cy="807277"/>
-          </a:xfrm>
-          <a:prstGeom prst="flowChartTerminator">
-            <a:avLst/>
-          </a:prstGeom>
-          <a:ln>
-            <a:noFill/>
-          </a:ln>
-          <a:effectLst>
-            <a:reflection blurRad="6350" stA="52000" endA="300" endPos="35000" dir="5400000" sy="-100000" algn="bl" rotWithShape="0"/>
-          </a:effectLst>
-          <a:scene3d>
-            <a:camera prst="orthographicFront"/>
-            <a:lightRig rig="threePt" dir="t"/>
-          </a:scene3d>
-          <a:sp3d>
-            <a:bevelT/>
-          </a:sp3d>
-        </p:spPr>
-        <p:style>
-          <a:lnRef idx="2">
-            <a:schemeClr val="accent6">
-              <a:shade val="50000"/>
-            </a:schemeClr>
-          </a:lnRef>
-          <a:fillRef idx="1">
-            <a:schemeClr val="accent6"/>
-          </a:fillRef>
-          <a:effectRef idx="0">
-            <a:schemeClr val="accent6"/>
-          </a:effectRef>
-          <a:fontRef idx="minor">
-            <a:schemeClr val="lt1"/>
-          </a:fontRef>
-        </p:style>
-        <p:txBody>
-          <a:bodyPr rtlCol="0" anchor="ctr"/>
-          <a:lstStyle/>
-          <a:p>
-            <a:pPr algn="ctr"/>
-            <a:r>
-              <a:rPr lang="es-ES" sz="1400">
-                <a:solidFill>
-                  <a:schemeClr val="bg1"/>
-                </a:solidFill>
-              </a:rPr>
-              <a:t>Finalización de todo el recorrido</a:t>
-            </a:r>
-          </a:p>
-        </p:txBody>
-      </p:sp>
-    </p:spTree>
-    <p:extLst>
-      <p:ext uri="{BB962C8B-B14F-4D97-AF65-F5344CB8AC3E}">
-        <p14:creationId xmlns:p14="http://schemas.microsoft.com/office/powerpoint/2010/main" val="1501923554"/>
-      </p:ext>
-    </p:extLst>
-  </p:cSld>
-  <p:clrMapOvr>
-    <a:masterClrMapping/>
-  </p:clrMapOvr>
-</p:sld>
-</file>
-
-<file path=ppt/slides/slide2.xml><?xml version="1.0" encoding="utf-8"?>
-<p:sld xmlns:a="http://schemas.openxmlformats.org/drawingml/2006/main" xmlns:r="http://schemas.openxmlformats.org/officeDocument/2006/relationships" xmlns:p="http://schemas.openxmlformats.org/presentationml/2006/main">
-  <p:cSld>
-    <p:spTree>
-      <p:nvGrpSpPr>
-        <p:cNvPr id="1" name=""/>
-        <p:cNvGrpSpPr/>
-        <p:nvPr/>
-      </p:nvGrpSpPr>
-      <p:grpSpPr>
-        <a:xfrm>
-          <a:off x="0" y="0"/>
-          <a:ext cx="0" cy="0"/>
-          <a:chOff x="0" y="0"/>
-          <a:chExt cx="0" cy="0"/>
-        </a:xfrm>
-      </p:grpSpPr>
-      <p:sp>
-        <p:nvSpPr>
-          <p:cNvPr id="5" name="CuadroTexto 4">
-            <a:extLst>
-              <a:ext uri="{FF2B5EF4-FFF2-40B4-BE49-F238E27FC236}">
-                <a16:creationId xmlns:a16="http://schemas.microsoft.com/office/drawing/2014/main" id="{842AFC76-F49D-47FF-9879-4FB1F55FB46E}"/>
-              </a:ext>
-            </a:extLst>
-          </p:cNvPr>
-          <p:cNvSpPr txBox="1"/>
-          <p:nvPr/>
-        </p:nvSpPr>
-        <p:spPr>
-          <a:xfrm>
-            <a:off x="383458" y="294968"/>
-            <a:ext cx="2772697" cy="369332"/>
-          </a:xfrm>
-          <a:prstGeom prst="rect">
-            <a:avLst/>
-          </a:prstGeom>
-          <a:noFill/>
-        </p:spPr>
-        <p:txBody>
-          <a:bodyPr wrap="square" rtlCol="0">
-            <a:spAutoFit/>
-          </a:bodyPr>
-          <a:lstStyle/>
-          <a:p>
-            <a:r>
-              <a:rPr lang="es-ES" b="1"/>
-              <a:t>Diagrama de flujo</a:t>
-            </a:r>
-          </a:p>
-        </p:txBody>
-      </p:sp>
-      <p:sp>
-        <p:nvSpPr>
-          <p:cNvPr id="18" name="Diagrama de flujo: proceso 17">
-            <a:extLst>
-              <a:ext uri="{FF2B5EF4-FFF2-40B4-BE49-F238E27FC236}">
-                <a16:creationId xmlns:a16="http://schemas.microsoft.com/office/drawing/2014/main" id="{D46555D8-8F8F-49B4-A101-D2B067C1F62C}"/>
-              </a:ext>
-            </a:extLst>
-          </p:cNvPr>
-          <p:cNvSpPr/>
-          <p:nvPr/>
-        </p:nvSpPr>
-        <p:spPr>
-          <a:xfrm>
-            <a:off x="2481417" y="721092"/>
-            <a:ext cx="1895166" cy="686259"/>
+            <a:off x="6374638" y="516390"/>
+            <a:ext cx="1066031" cy="386021"/>
           </a:xfrm>
           <a:prstGeom prst="flowChartProcess">
             <a:avLst/>
@@ -3497,7 +4751,7 @@
           <a:p>
             <a:pPr algn="ctr"/>
             <a:r>
-              <a:rPr lang="es-ES" sz="1200">
+              <a:rPr lang="es-ES" sz="675">
                 <a:solidFill>
                   <a:schemeClr val="accent6">
                     <a:lumMod val="50000"/>
@@ -3509,26 +4763,132 @@
           </a:p>
         </p:txBody>
       </p:sp>
+      <p:sp>
+        <p:nvSpPr>
+          <p:cNvPr id="130" name="Diagrama de flujo: proceso 129">
+            <a:extLst>
+              <a:ext uri="{FF2B5EF4-FFF2-40B4-BE49-F238E27FC236}">
+                <a16:creationId xmlns:a16="http://schemas.microsoft.com/office/drawing/2014/main" id="{96A4D4F9-E12D-45DF-9328-857AC0A981D0}"/>
+              </a:ext>
+            </a:extLst>
+          </p:cNvPr>
+          <p:cNvSpPr/>
+          <p:nvPr/>
+        </p:nvSpPr>
+        <p:spPr>
+          <a:xfrm>
+            <a:off x="6374638" y="1328407"/>
+            <a:ext cx="1066031" cy="386021"/>
+          </a:xfrm>
+          <a:prstGeom prst="flowChartProcess">
+            <a:avLst/>
+          </a:prstGeom>
+          <a:solidFill>
+            <a:schemeClr val="bg1"/>
+          </a:solidFill>
+          <a:ln>
+            <a:solidFill>
+              <a:schemeClr val="accent6">
+                <a:lumMod val="75000"/>
+              </a:schemeClr>
+            </a:solidFill>
+          </a:ln>
+          <a:effectLst>
+            <a:outerShdw blurRad="50800" dist="38100" dir="2700000" algn="tl" rotWithShape="0">
+              <a:prstClr val="black">
+                <a:alpha val="40000"/>
+              </a:prstClr>
+            </a:outerShdw>
+          </a:effectLst>
+        </p:spPr>
+        <p:style>
+          <a:lnRef idx="2">
+            <a:schemeClr val="accent1">
+              <a:shade val="50000"/>
+            </a:schemeClr>
+          </a:lnRef>
+          <a:fillRef idx="1">
+            <a:schemeClr val="accent1"/>
+          </a:fillRef>
+          <a:effectRef idx="0">
+            <a:schemeClr val="accent1"/>
+          </a:effectRef>
+          <a:fontRef idx="minor">
+            <a:schemeClr val="lt1"/>
+          </a:fontRef>
+        </p:style>
+        <p:txBody>
+          <a:bodyPr rtlCol="0" anchor="ctr"/>
+          <a:lstStyle/>
+          <a:p>
+            <a:pPr algn="ctr"/>
+            <a:r>
+              <a:rPr lang="es-ES" sz="675">
+                <a:solidFill>
+                  <a:schemeClr val="accent6">
+                    <a:lumMod val="50000"/>
+                  </a:schemeClr>
+                </a:solidFill>
+              </a:rPr>
+              <a:t>Cojo las</a:t>
+            </a:r>
+            <a:r>
+              <a:rPr lang="es-ES" sz="675">
+                <a:solidFill>
+                  <a:srgbClr val="FF0000"/>
+                </a:solidFill>
+              </a:rPr>
+              <a:t> </a:t>
+            </a:r>
+            <a:r>
+              <a:rPr lang="es-ES" sz="675" b="1">
+                <a:solidFill>
+                  <a:srgbClr val="FF0000"/>
+                </a:solidFill>
+              </a:rPr>
+              <a:t>favorite</a:t>
+            </a:r>
+            <a:r>
+              <a:rPr lang="es-ES" sz="675">
+                <a:solidFill>
+                  <a:srgbClr val="FF0000"/>
+                </a:solidFill>
+              </a:rPr>
+              <a:t> </a:t>
+            </a:r>
+            <a:r>
+              <a:rPr lang="es-ES" sz="675">
+                <a:solidFill>
+                  <a:schemeClr val="accent6">
+                    <a:lumMod val="50000"/>
+                  </a:schemeClr>
+                </a:solidFill>
+              </a:rPr>
+              <a:t>del local storage</a:t>
+            </a:r>
+          </a:p>
+        </p:txBody>
+      </p:sp>
       <p:cxnSp>
         <p:nvCxnSpPr>
-          <p:cNvPr id="32" name="Conector recto de flecha 31">
+          <p:cNvPr id="135" name="Conector recto de flecha 134">
             <a:extLst>
               <a:ext uri="{FF2B5EF4-FFF2-40B4-BE49-F238E27FC236}">
-                <a16:creationId xmlns:a16="http://schemas.microsoft.com/office/drawing/2014/main" id="{D049F65C-22F4-44BA-B152-B3F22CEEDA6B}"/>
+                <a16:creationId xmlns:a16="http://schemas.microsoft.com/office/drawing/2014/main" id="{5D011DEF-6642-4019-BB92-DB0E39726779}"/>
               </a:ext>
             </a:extLst>
           </p:cNvPr>
           <p:cNvCxnSpPr>
             <a:cxnSpLocks/>
-            <a:stCxn id="18" idx="2"/>
-            <a:endCxn id="46" idx="0"/>
+            <a:stCxn id="129" idx="2"/>
+            <a:endCxn id="130" idx="0"/>
           </p:cNvCxnSpPr>
           <p:nvPr/>
         </p:nvCxnSpPr>
         <p:spPr>
-          <a:xfrm flipH="1">
-            <a:off x="3428104" y="1407351"/>
-            <a:ext cx="896" cy="206784"/>
+          <a:xfrm>
+            <a:off x="6907654" y="902411"/>
+            <a:ext cx="0" cy="425996"/>
           </a:xfrm>
           <a:prstGeom prst="straightConnector1">
             <a:avLst/>
@@ -3554,10 +4914,10 @@
       </p:cxnSp>
       <p:sp>
         <p:nvSpPr>
-          <p:cNvPr id="46" name="Diagrama de flujo: decisión 45">
+          <p:cNvPr id="150" name="Diagrama de flujo: decisión 149">
             <a:extLst>
               <a:ext uri="{FF2B5EF4-FFF2-40B4-BE49-F238E27FC236}">
-                <a16:creationId xmlns:a16="http://schemas.microsoft.com/office/drawing/2014/main" id="{E6027E2B-2D04-496D-BF40-258A46D99ECB}"/>
+                <a16:creationId xmlns:a16="http://schemas.microsoft.com/office/drawing/2014/main" id="{9E02F1EE-344A-4D66-A109-A04C737E434F}"/>
               </a:ext>
             </a:extLst>
           </p:cNvPr>
@@ -3566,8 +4926,8 @@
         </p:nvSpPr>
         <p:spPr>
           <a:xfrm>
-            <a:off x="2285056" y="1614135"/>
-            <a:ext cx="2286096" cy="1015564"/>
+            <a:off x="7997725" y="1328407"/>
+            <a:ext cx="1285929" cy="571255"/>
           </a:xfrm>
           <a:prstGeom prst="flowChartDecision">
             <a:avLst/>
@@ -3612,27 +4972,41 @@
           <a:p>
             <a:pPr algn="ctr"/>
             <a:r>
-              <a:rPr lang="es-ES" sz="1200">
+              <a:rPr lang="es-ES" sz="675">
                 <a:solidFill>
                   <a:schemeClr val="accent6">
                     <a:lumMod val="50000"/>
                   </a:schemeClr>
                 </a:solidFill>
               </a:rPr>
-              <a:t>¿Tengo el/los dato/s X en </a:t>
-            </a:r>
-            <a:r>
-              <a:rPr lang="es-ES" sz="1200" err="1">
+              <a:t>¿Está en </a:t>
+            </a:r>
+            <a:r>
+              <a:rPr lang="es-ES" sz="675">
                 <a:solidFill>
-                  <a:schemeClr val="accent6">
-                    <a:lumMod val="50000"/>
-                  </a:schemeClr>
+                  <a:srgbClr val="FF0000"/>
                 </a:solidFill>
               </a:rPr>
-              <a:t>localStorage</a:t>
-            </a:r>
-            <a:r>
-              <a:rPr lang="es-ES" sz="1200">
+              <a:t> </a:t>
+            </a:r>
+            <a:r>
+              <a:rPr lang="es-ES" sz="675" b="1">
+                <a:solidFill>
+                  <a:srgbClr val="FF0000"/>
+                </a:solidFill>
+              </a:rPr>
+              <a:t>favorite</a:t>
+            </a:r>
+            <a:r>
+              <a:rPr lang="es-ES" sz="675">
+                <a:solidFill>
+                  <a:srgbClr val="FF0000"/>
+                </a:solidFill>
+              </a:rPr>
+              <a:t> </a:t>
+            </a:r>
+            <a:r>
+              <a:rPr lang="es-ES" sz="675">
                 <a:solidFill>
                   <a:schemeClr val="accent6">
                     <a:lumMod val="50000"/>
@@ -3644,170 +5018,12 @@
           </a:p>
         </p:txBody>
       </p:sp>
-      <p:cxnSp>
-        <p:nvCxnSpPr>
-          <p:cNvPr id="47" name="Conector: angular 46">
+      <p:sp>
+        <p:nvSpPr>
+          <p:cNvPr id="154" name="Diagrama de flujo: proceso 153">
             <a:extLst>
               <a:ext uri="{FF2B5EF4-FFF2-40B4-BE49-F238E27FC236}">
-                <a16:creationId xmlns:a16="http://schemas.microsoft.com/office/drawing/2014/main" id="{70020C51-0785-4119-8E79-0AE10F34806C}"/>
-              </a:ext>
-            </a:extLst>
-          </p:cNvPr>
-          <p:cNvCxnSpPr>
-            <a:cxnSpLocks/>
-            <a:stCxn id="46" idx="1"/>
-            <a:endCxn id="64" idx="0"/>
-          </p:cNvCxnSpPr>
-          <p:nvPr/>
-        </p:nvCxnSpPr>
-        <p:spPr>
-          <a:xfrm rot="10800000" flipV="1">
-            <a:off x="1675112" y="2121916"/>
-            <a:ext cx="609945" cy="530685"/>
-          </a:xfrm>
-          <a:prstGeom prst="bentConnector2">
-            <a:avLst/>
-          </a:prstGeom>
-          <a:ln>
-            <a:tailEnd type="triangle"/>
-          </a:ln>
-        </p:spPr>
-        <p:style>
-          <a:lnRef idx="1">
-            <a:schemeClr val="dk1"/>
-          </a:lnRef>
-          <a:fillRef idx="0">
-            <a:schemeClr val="dk1"/>
-          </a:fillRef>
-          <a:effectRef idx="0">
-            <a:schemeClr val="dk1"/>
-          </a:effectRef>
-          <a:fontRef idx="minor">
-            <a:schemeClr val="tx1"/>
-          </a:fontRef>
-        </p:style>
-      </p:cxnSp>
-      <p:cxnSp>
-        <p:nvCxnSpPr>
-          <p:cNvPr id="48" name="Conector: angular 47">
-            <a:extLst>
-              <a:ext uri="{FF2B5EF4-FFF2-40B4-BE49-F238E27FC236}">
-                <a16:creationId xmlns:a16="http://schemas.microsoft.com/office/drawing/2014/main" id="{3C1607D1-1EA8-4039-B968-DE90F1195177}"/>
-              </a:ext>
-            </a:extLst>
-          </p:cNvPr>
-          <p:cNvCxnSpPr>
-            <a:cxnSpLocks/>
-            <a:stCxn id="46" idx="3"/>
-            <a:endCxn id="67" idx="0"/>
-          </p:cNvCxnSpPr>
-          <p:nvPr/>
-        </p:nvCxnSpPr>
-        <p:spPr>
-          <a:xfrm>
-            <a:off x="4571152" y="2121917"/>
-            <a:ext cx="611737" cy="531827"/>
-          </a:xfrm>
-          <a:prstGeom prst="bentConnector2">
-            <a:avLst/>
-          </a:prstGeom>
-          <a:ln>
-            <a:tailEnd type="triangle"/>
-          </a:ln>
-        </p:spPr>
-        <p:style>
-          <a:lnRef idx="1">
-            <a:schemeClr val="dk1"/>
-          </a:lnRef>
-          <a:fillRef idx="0">
-            <a:schemeClr val="dk1"/>
-          </a:fillRef>
-          <a:effectRef idx="0">
-            <a:schemeClr val="dk1"/>
-          </a:effectRef>
-          <a:fontRef idx="minor">
-            <a:schemeClr val="tx1"/>
-          </a:fontRef>
-        </p:style>
-      </p:cxnSp>
-      <p:sp>
-        <p:nvSpPr>
-          <p:cNvPr id="50" name="CuadroTexto 49">
-            <a:extLst>
-              <a:ext uri="{FF2B5EF4-FFF2-40B4-BE49-F238E27FC236}">
-                <a16:creationId xmlns:a16="http://schemas.microsoft.com/office/drawing/2014/main" id="{48D0C5EE-1026-4D33-9B79-A2BB09D159FB}"/>
-              </a:ext>
-            </a:extLst>
-          </p:cNvPr>
-          <p:cNvSpPr txBox="1"/>
-          <p:nvPr/>
-        </p:nvSpPr>
-        <p:spPr>
-          <a:xfrm>
-            <a:off x="1519092" y="1893975"/>
-            <a:ext cx="516146" cy="276999"/>
-          </a:xfrm>
-          <a:prstGeom prst="rect">
-            <a:avLst/>
-          </a:prstGeom>
-          <a:noFill/>
-        </p:spPr>
-        <p:txBody>
-          <a:bodyPr wrap="square" rtlCol="0">
-            <a:spAutoFit/>
-          </a:bodyPr>
-          <a:lstStyle/>
-          <a:p>
-            <a:pPr algn="ctr"/>
-            <a:r>
-              <a:rPr lang="es-ES" sz="1200" b="1"/>
-              <a:t>NO</a:t>
-            </a:r>
-          </a:p>
-        </p:txBody>
-      </p:sp>
-      <p:sp>
-        <p:nvSpPr>
-          <p:cNvPr id="55" name="CuadroTexto 54">
-            <a:extLst>
-              <a:ext uri="{FF2B5EF4-FFF2-40B4-BE49-F238E27FC236}">
-                <a16:creationId xmlns:a16="http://schemas.microsoft.com/office/drawing/2014/main" id="{FBBA36EA-69CC-4211-B96C-E82963FF86BC}"/>
-              </a:ext>
-            </a:extLst>
-          </p:cNvPr>
-          <p:cNvSpPr txBox="1"/>
-          <p:nvPr/>
-        </p:nvSpPr>
-        <p:spPr>
-          <a:xfrm>
-            <a:off x="4786870" y="1873618"/>
-            <a:ext cx="516146" cy="276999"/>
-          </a:xfrm>
-          <a:prstGeom prst="rect">
-            <a:avLst/>
-          </a:prstGeom>
-          <a:noFill/>
-        </p:spPr>
-        <p:txBody>
-          <a:bodyPr wrap="square" rtlCol="0">
-            <a:spAutoFit/>
-          </a:bodyPr>
-          <a:lstStyle/>
-          <a:p>
-            <a:pPr algn="ctr"/>
-            <a:r>
-              <a:rPr lang="es-ES" sz="1200" b="1"/>
-              <a:t>SI</a:t>
-            </a:r>
-          </a:p>
-        </p:txBody>
-      </p:sp>
-      <p:sp>
-        <p:nvSpPr>
-          <p:cNvPr id="64" name="Diagrama de flujo: proceso 63">
-            <a:extLst>
-              <a:ext uri="{FF2B5EF4-FFF2-40B4-BE49-F238E27FC236}">
-                <a16:creationId xmlns:a16="http://schemas.microsoft.com/office/drawing/2014/main" id="{B65F5A48-83DC-4947-BFA5-D36C8913F35F}"/>
+                <a16:creationId xmlns:a16="http://schemas.microsoft.com/office/drawing/2014/main" id="{5A43DFB9-8024-4A42-BE52-4E5428CC2BFD}"/>
               </a:ext>
             </a:extLst>
           </p:cNvPr>
@@ -3816,8 +5032,8 @@
         </p:nvSpPr>
         <p:spPr>
           <a:xfrm>
-            <a:off x="727528" y="2652602"/>
-            <a:ext cx="1895166" cy="686259"/>
+            <a:off x="9595505" y="2124389"/>
+            <a:ext cx="1066031" cy="386021"/>
           </a:xfrm>
           <a:prstGeom prst="flowChartProcess">
             <a:avLst/>
@@ -3862,24 +5078,47 @@
           <a:p>
             <a:pPr algn="ctr"/>
             <a:r>
-              <a:rPr lang="es-ES" sz="1200">
+              <a:rPr lang="es-ES" sz="675">
                 <a:solidFill>
                   <a:schemeClr val="accent6">
                     <a:lumMod val="50000"/>
                   </a:schemeClr>
                 </a:solidFill>
               </a:rPr>
-              <a:t>Solicito los datos</a:t>
-            </a:r>
-          </a:p>
-        </p:txBody>
-      </p:sp>
-      <p:sp>
-        <p:nvSpPr>
-          <p:cNvPr id="67" name="Diagrama de flujo: proceso 66">
+              <a:t>Eliminar de </a:t>
+            </a:r>
+            <a:r>
+              <a:rPr lang="es-ES" sz="675" b="1">
+                <a:solidFill>
+                  <a:srgbClr val="FF0000"/>
+                </a:solidFill>
+              </a:rPr>
+              <a:t>favorite</a:t>
+            </a:r>
+            <a:r>
+              <a:rPr lang="es-ES" sz="675">
+                <a:solidFill>
+                  <a:srgbClr val="FF0000"/>
+                </a:solidFill>
+              </a:rPr>
+              <a:t> </a:t>
+            </a:r>
+            <a:endParaRPr lang="es-ES" sz="675">
+              <a:solidFill>
+                <a:schemeClr val="accent6">
+                  <a:lumMod val="50000"/>
+                </a:schemeClr>
+              </a:solidFill>
+            </a:endParaRPr>
+          </a:p>
+        </p:txBody>
+      </p:sp>
+      <p:sp>
+        <p:nvSpPr>
+          <p:cNvPr id="156" name="Diagrama de flujo: proceso 155">
             <a:extLst>
               <a:ext uri="{FF2B5EF4-FFF2-40B4-BE49-F238E27FC236}">
-                <a16:creationId xmlns:a16="http://schemas.microsoft.com/office/drawing/2014/main" id="{5804D380-4B02-4878-AD22-67E34540895A}"/>
+                <a16:creationId xmlns:a16="http://schemas.microsoft.com/office/drawing/2014/main" id="{FCE4FDDF-0AB6-42D6-BBF1-D3865ED18935}"/>
               </a:ext>
             </a:extLst>
           </p:cNvPr>
@@ -3888,8 +5127,8 @@
         </p:nvSpPr>
         <p:spPr>
           <a:xfrm>
-            <a:off x="4235306" y="2653744"/>
-            <a:ext cx="1895166" cy="686259"/>
+            <a:off x="9595505" y="516390"/>
+            <a:ext cx="1066031" cy="386021"/>
           </a:xfrm>
           <a:prstGeom prst="flowChartProcess">
             <a:avLst/>
@@ -3934,24 +5173,180 @@
           <a:p>
             <a:pPr algn="ctr"/>
             <a:r>
-              <a:rPr lang="es-ES" sz="1200">
+              <a:rPr lang="es-ES" sz="675">
                 <a:solidFill>
                   <a:schemeClr val="accent6">
                     <a:lumMod val="50000"/>
                   </a:schemeClr>
                 </a:solidFill>
               </a:rPr>
-              <a:t>Tomo los datos de localStorage</a:t>
-            </a:r>
-          </a:p>
-        </p:txBody>
-      </p:sp>
-      <p:sp>
-        <p:nvSpPr>
-          <p:cNvPr id="68" name="Diagrama de flujo: proceso 67">
+              <a:t>Click sobre aspa X de </a:t>
+            </a:r>
+            <a:r>
+              <a:rPr lang="es-ES" sz="675">
+                <a:solidFill>
+                  <a:srgbClr val="FF0000"/>
+                </a:solidFill>
+              </a:rPr>
+              <a:t> </a:t>
+            </a:r>
+            <a:r>
+              <a:rPr lang="es-ES" sz="675" b="1">
+                <a:solidFill>
+                  <a:srgbClr val="FF0000"/>
+                </a:solidFill>
+              </a:rPr>
+              <a:t>favorite</a:t>
+            </a:r>
+            <a:r>
+              <a:rPr lang="es-ES" sz="675">
+                <a:solidFill>
+                  <a:srgbClr val="FF0000"/>
+                </a:solidFill>
+              </a:rPr>
+              <a:t> </a:t>
+            </a:r>
+            <a:r>
+              <a:rPr lang="es-ES" sz="675">
+                <a:solidFill>
+                  <a:schemeClr val="accent6">
+                    <a:lumMod val="50000"/>
+                  </a:schemeClr>
+                </a:solidFill>
+              </a:rPr>
+              <a:t> </a:t>
+            </a:r>
+          </a:p>
+        </p:txBody>
+      </p:sp>
+      <p:cxnSp>
+        <p:nvCxnSpPr>
+          <p:cNvPr id="162" name="Conector recto de flecha 161">
             <a:extLst>
               <a:ext uri="{FF2B5EF4-FFF2-40B4-BE49-F238E27FC236}">
-                <a16:creationId xmlns:a16="http://schemas.microsoft.com/office/drawing/2014/main" id="{4E2954F5-DC13-45D4-983F-109261152963}"/>
+                <a16:creationId xmlns:a16="http://schemas.microsoft.com/office/drawing/2014/main" id="{2EF6B420-B08E-4058-AF5B-9B3D5707FB64}"/>
+              </a:ext>
+            </a:extLst>
+          </p:cNvPr>
+          <p:cNvCxnSpPr>
+            <a:cxnSpLocks/>
+            <a:stCxn id="37" idx="2"/>
+            <a:endCxn id="150" idx="0"/>
+          </p:cNvCxnSpPr>
+          <p:nvPr/>
+        </p:nvCxnSpPr>
+        <p:spPr>
+          <a:xfrm>
+            <a:off x="8640690" y="918487"/>
+            <a:ext cx="0" cy="409920"/>
+          </a:xfrm>
+          <a:prstGeom prst="straightConnector1">
+            <a:avLst/>
+          </a:prstGeom>
+          <a:ln>
+            <a:tailEnd type="triangle"/>
+          </a:ln>
+        </p:spPr>
+        <p:style>
+          <a:lnRef idx="1">
+            <a:schemeClr val="dk1"/>
+          </a:lnRef>
+          <a:fillRef idx="0">
+            <a:schemeClr val="dk1"/>
+          </a:fillRef>
+          <a:effectRef idx="0">
+            <a:schemeClr val="dk1"/>
+          </a:effectRef>
+          <a:fontRef idx="minor">
+            <a:schemeClr val="tx1"/>
+          </a:fontRef>
+        </p:style>
+      </p:cxnSp>
+      <p:sp>
+        <p:nvSpPr>
+          <p:cNvPr id="168" name="CuadroTexto 167">
+            <a:extLst>
+              <a:ext uri="{FF2B5EF4-FFF2-40B4-BE49-F238E27FC236}">
+                <a16:creationId xmlns:a16="http://schemas.microsoft.com/office/drawing/2014/main" id="{50F98A5E-6918-4B08-ADB2-9212C49F6478}"/>
+              </a:ext>
+            </a:extLst>
+          </p:cNvPr>
+          <p:cNvSpPr txBox="1"/>
+          <p:nvPr/>
+        </p:nvSpPr>
+        <p:spPr>
+          <a:xfrm>
+            <a:off x="7693179" y="1409518"/>
+            <a:ext cx="430614" cy="196208"/>
+          </a:xfrm>
+          <a:prstGeom prst="rect">
+            <a:avLst/>
+          </a:prstGeom>
+          <a:noFill/>
+        </p:spPr>
+        <p:txBody>
+          <a:bodyPr wrap="square" rtlCol="0">
+            <a:spAutoFit/>
+          </a:bodyPr>
+          <a:lstStyle/>
+          <a:p>
+            <a:pPr algn="ctr"/>
+            <a:r>
+              <a:rPr lang="es-ES" sz="675" b="1"/>
+              <a:t>NO</a:t>
+            </a:r>
+          </a:p>
+        </p:txBody>
+      </p:sp>
+      <p:cxnSp>
+        <p:nvCxnSpPr>
+          <p:cNvPr id="169" name="Conector: angular 168">
+            <a:extLst>
+              <a:ext uri="{FF2B5EF4-FFF2-40B4-BE49-F238E27FC236}">
+                <a16:creationId xmlns:a16="http://schemas.microsoft.com/office/drawing/2014/main" id="{C7422AAC-C703-449B-9B67-3DD564680F1E}"/>
+              </a:ext>
+            </a:extLst>
+          </p:cNvPr>
+          <p:cNvCxnSpPr>
+            <a:cxnSpLocks/>
+            <a:stCxn id="150" idx="1"/>
+            <a:endCxn id="171" idx="0"/>
+          </p:cNvCxnSpPr>
+          <p:nvPr/>
+        </p:nvCxnSpPr>
+        <p:spPr>
+          <a:xfrm rot="10800000" flipV="1">
+            <a:off x="7836533" y="1614034"/>
+            <a:ext cx="161192" cy="543689"/>
+          </a:xfrm>
+          <a:prstGeom prst="bentConnector2">
+            <a:avLst/>
+          </a:prstGeom>
+          <a:ln>
+            <a:tailEnd type="triangle"/>
+          </a:ln>
+        </p:spPr>
+        <p:style>
+          <a:lnRef idx="1">
+            <a:schemeClr val="dk1"/>
+          </a:lnRef>
+          <a:fillRef idx="0">
+            <a:schemeClr val="dk1"/>
+          </a:fillRef>
+          <a:effectRef idx="0">
+            <a:schemeClr val="dk1"/>
+          </a:effectRef>
+          <a:fontRef idx="minor">
+            <a:schemeClr val="tx1"/>
+          </a:fontRef>
+        </p:style>
+      </p:cxnSp>
+      <p:sp>
+        <p:nvSpPr>
+          <p:cNvPr id="171" name="Diagrama de flujo: proceso 170">
+            <a:extLst>
+              <a:ext uri="{FF2B5EF4-FFF2-40B4-BE49-F238E27FC236}">
+                <a16:creationId xmlns:a16="http://schemas.microsoft.com/office/drawing/2014/main" id="{D7E9F989-ECC2-49A9-BDD3-6B2DF746A1B9}"/>
               </a:ext>
             </a:extLst>
           </p:cNvPr>
@@ -3960,8 +5355,8 @@
         </p:nvSpPr>
         <p:spPr>
           <a:xfrm>
-            <a:off x="2504845" y="3746494"/>
-            <a:ext cx="1895166" cy="686259"/>
+            <a:off x="7303517" y="2157724"/>
+            <a:ext cx="1066031" cy="386021"/>
           </a:xfrm>
           <a:prstGeom prst="flowChartProcess">
             <a:avLst/>
@@ -4006,38 +5401,92 @@
           <a:p>
             <a:pPr algn="ctr"/>
             <a:r>
-              <a:rPr lang="es-ES" sz="1200">
+              <a:rPr lang="es-ES" sz="675">
                 <a:solidFill>
                   <a:schemeClr val="accent6">
                     <a:lumMod val="50000"/>
                   </a:schemeClr>
                 </a:solidFill>
               </a:rPr>
-              <a:t>Guardo en una variable GLOBAL el/los dato/s X</a:t>
+              <a:t>Añadir a </a:t>
+            </a:r>
+            <a:r>
+              <a:rPr lang="es-ES" sz="675" b="1">
+                <a:solidFill>
+                  <a:srgbClr val="FF0000"/>
+                </a:solidFill>
+              </a:rPr>
+              <a:t>favorite</a:t>
+            </a:r>
+            <a:r>
+              <a:rPr lang="es-ES" sz="675">
+                <a:solidFill>
+                  <a:schemeClr val="accent6">
+                    <a:lumMod val="50000"/>
+                  </a:schemeClr>
+                </a:solidFill>
+              </a:rPr>
+              <a:t> </a:t>
+            </a:r>
+          </a:p>
+        </p:txBody>
+      </p:sp>
+      <p:sp>
+        <p:nvSpPr>
+          <p:cNvPr id="175" name="CuadroTexto 174">
+            <a:extLst>
+              <a:ext uri="{FF2B5EF4-FFF2-40B4-BE49-F238E27FC236}">
+                <a16:creationId xmlns:a16="http://schemas.microsoft.com/office/drawing/2014/main" id="{F43168F2-5226-4C55-B4F7-E153A48C3474}"/>
+              </a:ext>
+            </a:extLst>
+          </p:cNvPr>
+          <p:cNvSpPr txBox="1"/>
+          <p:nvPr/>
+        </p:nvSpPr>
+        <p:spPr>
+          <a:xfrm>
+            <a:off x="9119547" y="1408360"/>
+            <a:ext cx="430614" cy="196208"/>
+          </a:xfrm>
+          <a:prstGeom prst="rect">
+            <a:avLst/>
+          </a:prstGeom>
+          <a:noFill/>
+        </p:spPr>
+        <p:txBody>
+          <a:bodyPr wrap="square" rtlCol="0">
+            <a:spAutoFit/>
+          </a:bodyPr>
+          <a:lstStyle/>
+          <a:p>
+            <a:pPr algn="ctr"/>
+            <a:r>
+              <a:rPr lang="es-ES" sz="675" b="1"/>
+              <a:t>Si</a:t>
             </a:r>
           </a:p>
         </p:txBody>
       </p:sp>
       <p:cxnSp>
         <p:nvCxnSpPr>
-          <p:cNvPr id="71" name="Conector: angular 70">
+          <p:cNvPr id="176" name="Conector: angular 175">
             <a:extLst>
               <a:ext uri="{FF2B5EF4-FFF2-40B4-BE49-F238E27FC236}">
-                <a16:creationId xmlns:a16="http://schemas.microsoft.com/office/drawing/2014/main" id="{5AF0F293-2BE7-429A-A618-52919FA61356}"/>
+                <a16:creationId xmlns:a16="http://schemas.microsoft.com/office/drawing/2014/main" id="{77AE9FF9-CE3D-43F9-B043-993FD2AD6B86}"/>
               </a:ext>
             </a:extLst>
           </p:cNvPr>
           <p:cNvCxnSpPr>
             <a:cxnSpLocks/>
-            <a:stCxn id="64" idx="2"/>
-            <a:endCxn id="68" idx="0"/>
+            <a:stCxn id="150" idx="3"/>
+            <a:endCxn id="154" idx="1"/>
           </p:cNvCxnSpPr>
           <p:nvPr/>
         </p:nvCxnSpPr>
         <p:spPr>
-          <a:xfrm rot="16200000" flipH="1">
-            <a:off x="2359953" y="2654018"/>
-            <a:ext cx="407633" cy="1777317"/>
+          <a:xfrm>
+            <a:off x="9283654" y="1614035"/>
+            <a:ext cx="311851" cy="703365"/>
           </a:xfrm>
           <a:prstGeom prst="bentConnector3">
             <a:avLst>
@@ -4065,29 +5514,27 @@
       </p:cxnSp>
       <p:cxnSp>
         <p:nvCxnSpPr>
-          <p:cNvPr id="74" name="Conector: angular 73">
+          <p:cNvPr id="186" name="Conector recto de flecha 185">
             <a:extLst>
               <a:ext uri="{FF2B5EF4-FFF2-40B4-BE49-F238E27FC236}">
-                <a16:creationId xmlns:a16="http://schemas.microsoft.com/office/drawing/2014/main" id="{BD962905-F5BD-4A7B-A55E-CF0BE6A14109}"/>
+                <a16:creationId xmlns:a16="http://schemas.microsoft.com/office/drawing/2014/main" id="{F37FB024-D18F-46B4-9C10-FBF8D1711AD4}"/>
               </a:ext>
             </a:extLst>
           </p:cNvPr>
           <p:cNvCxnSpPr>
             <a:cxnSpLocks/>
-            <a:stCxn id="67" idx="2"/>
-            <a:endCxn id="68" idx="0"/>
+            <a:stCxn id="156" idx="2"/>
+            <a:endCxn id="154" idx="0"/>
           </p:cNvCxnSpPr>
           <p:nvPr/>
         </p:nvCxnSpPr>
         <p:spPr>
-          <a:xfrm rot="5400000">
-            <a:off x="4114414" y="2678018"/>
-            <a:ext cx="406491" cy="1730461"/>
-          </a:xfrm>
-          <a:prstGeom prst="bentConnector3">
-            <a:avLst>
-              <a:gd name="adj1" fmla="val 50000"/>
-            </a:avLst>
+          <a:xfrm>
+            <a:off x="10128521" y="902411"/>
+            <a:ext cx="0" cy="1221978"/>
+          </a:xfrm>
+          <a:prstGeom prst="straightConnector1">
+            <a:avLst/>
           </a:prstGeom>
           <a:ln>
             <a:tailEnd type="triangle"/>
@@ -4108,72 +5555,181 @@
           </a:fontRef>
         </p:style>
       </p:cxnSp>
-      <p:sp>
-        <p:nvSpPr>
-          <p:cNvPr id="75" name="Diagrama de flujo: terminador 74">
+      <p:cxnSp>
+        <p:nvCxnSpPr>
+          <p:cNvPr id="197" name="Conector: angular 196">
             <a:extLst>
               <a:ext uri="{FF2B5EF4-FFF2-40B4-BE49-F238E27FC236}">
-                <a16:creationId xmlns:a16="http://schemas.microsoft.com/office/drawing/2014/main" id="{AC2019BC-9121-45A7-A878-3200867C9BA5}"/>
+                <a16:creationId xmlns:a16="http://schemas.microsoft.com/office/drawing/2014/main" id="{F5E4BA23-F80A-45B7-B006-494A8E4AA106}"/>
               </a:ext>
             </a:extLst>
           </p:cNvPr>
-          <p:cNvSpPr/>
+          <p:cNvCxnSpPr>
+            <a:cxnSpLocks/>
+            <a:stCxn id="171" idx="2"/>
+            <a:endCxn id="24" idx="3"/>
+          </p:cNvCxnSpPr>
           <p:nvPr/>
-        </p:nvSpPr>
-        <p:spPr>
-          <a:xfrm>
-            <a:off x="2285056" y="10988275"/>
-            <a:ext cx="2286096" cy="807277"/>
-          </a:xfrm>
-          <a:prstGeom prst="flowChartTerminator">
+        </p:nvCxnSpPr>
+        <p:spPr>
+          <a:xfrm rot="5400000">
+            <a:off x="6634239" y="3350175"/>
+            <a:ext cx="2008725" cy="395864"/>
+          </a:xfrm>
+          <a:prstGeom prst="bentConnector2">
             <a:avLst/>
           </a:prstGeom>
           <a:ln>
-            <a:noFill/>
+            <a:tailEnd type="triangle"/>
           </a:ln>
-          <a:effectLst>
-            <a:reflection blurRad="6350" stA="52000" endA="300" endPos="35000" dir="5400000" sy="-100000" algn="bl" rotWithShape="0"/>
-          </a:effectLst>
-          <a:scene3d>
-            <a:camera prst="orthographicFront"/>
-            <a:lightRig rig="threePt" dir="t"/>
-          </a:scene3d>
-          <a:sp3d>
-            <a:bevelT/>
-          </a:sp3d>
         </p:spPr>
         <p:style>
-          <a:lnRef idx="2">
-            <a:schemeClr val="accent6">
-              <a:shade val="50000"/>
-            </a:schemeClr>
+          <a:lnRef idx="1">
+            <a:schemeClr val="dk1"/>
           </a:lnRef>
-          <a:fillRef idx="1">
-            <a:schemeClr val="accent6"/>
+          <a:fillRef idx="0">
+            <a:schemeClr val="dk1"/>
           </a:fillRef>
           <a:effectRef idx="0">
-            <a:schemeClr val="accent6"/>
+            <a:schemeClr val="dk1"/>
           </a:effectRef>
           <a:fontRef idx="minor">
-            <a:schemeClr val="lt1"/>
+            <a:schemeClr val="tx1"/>
           </a:fontRef>
         </p:style>
-        <p:txBody>
-          <a:bodyPr rtlCol="0" anchor="ctr"/>
-          <a:lstStyle/>
-          <a:p>
-            <a:pPr algn="ctr"/>
-            <a:r>
-              <a:rPr lang="es-ES" sz="1400">
-                <a:solidFill>
-                  <a:schemeClr val="bg1"/>
-                </a:solidFill>
-              </a:rPr>
-              <a:t>Finalización de todo el recorrido</a:t>
-            </a:r>
-          </a:p>
-        </p:txBody>
-      </p:sp>
+      </p:cxnSp>
+      <p:cxnSp>
+        <p:nvCxnSpPr>
+          <p:cNvPr id="200" name="Conector: angular 199">
+            <a:extLst>
+              <a:ext uri="{FF2B5EF4-FFF2-40B4-BE49-F238E27FC236}">
+                <a16:creationId xmlns:a16="http://schemas.microsoft.com/office/drawing/2014/main" id="{93024E65-F47B-4C60-88BD-254DC8237AF0}"/>
+              </a:ext>
+            </a:extLst>
+          </p:cNvPr>
+          <p:cNvCxnSpPr>
+            <a:cxnSpLocks/>
+            <a:stCxn id="154" idx="2"/>
+            <a:endCxn id="24" idx="3"/>
+          </p:cNvCxnSpPr>
+          <p:nvPr/>
+        </p:nvCxnSpPr>
+        <p:spPr>
+          <a:xfrm rot="5400000">
+            <a:off x="7763565" y="2187514"/>
+            <a:ext cx="2042060" cy="2687852"/>
+          </a:xfrm>
+          <a:prstGeom prst="bentConnector2">
+            <a:avLst/>
+          </a:prstGeom>
+          <a:ln>
+            <a:tailEnd type="triangle"/>
+          </a:ln>
+        </p:spPr>
+        <p:style>
+          <a:lnRef idx="1">
+            <a:schemeClr val="dk1"/>
+          </a:lnRef>
+          <a:fillRef idx="0">
+            <a:schemeClr val="dk1"/>
+          </a:fillRef>
+          <a:effectRef idx="0">
+            <a:schemeClr val="dk1"/>
+          </a:effectRef>
+          <a:fontRef idx="minor">
+            <a:schemeClr val="tx1"/>
+          </a:fontRef>
+        </p:style>
+      </p:cxnSp>
+      <p:cxnSp>
+        <p:nvCxnSpPr>
+          <p:cNvPr id="208" name="Conector recto de flecha 207">
+            <a:extLst>
+              <a:ext uri="{FF2B5EF4-FFF2-40B4-BE49-F238E27FC236}">
+                <a16:creationId xmlns:a16="http://schemas.microsoft.com/office/drawing/2014/main" id="{002A5CD3-E015-4E93-B7BD-19C4A0858AD0}"/>
+              </a:ext>
+            </a:extLst>
+          </p:cNvPr>
+          <p:cNvCxnSpPr>
+            <a:cxnSpLocks/>
+            <a:stCxn id="130" idx="2"/>
+            <a:endCxn id="24" idx="0"/>
+          </p:cNvCxnSpPr>
+          <p:nvPr/>
+        </p:nvCxnSpPr>
+        <p:spPr>
+          <a:xfrm>
+            <a:off x="6907654" y="1714428"/>
+            <a:ext cx="0" cy="2645031"/>
+          </a:xfrm>
+          <a:prstGeom prst="straightConnector1">
+            <a:avLst/>
+          </a:prstGeom>
+          <a:ln>
+            <a:tailEnd type="triangle"/>
+          </a:ln>
+        </p:spPr>
+        <p:style>
+          <a:lnRef idx="1">
+            <a:schemeClr val="dk1"/>
+          </a:lnRef>
+          <a:fillRef idx="0">
+            <a:schemeClr val="dk1"/>
+          </a:fillRef>
+          <a:effectRef idx="0">
+            <a:schemeClr val="dk1"/>
+          </a:effectRef>
+          <a:fontRef idx="minor">
+            <a:schemeClr val="tx1"/>
+          </a:fontRef>
+        </p:style>
+      </p:cxnSp>
+      <p:cxnSp>
+        <p:nvCxnSpPr>
+          <p:cNvPr id="224" name="Conector: angular 223">
+            <a:extLst>
+              <a:ext uri="{FF2B5EF4-FFF2-40B4-BE49-F238E27FC236}">
+                <a16:creationId xmlns:a16="http://schemas.microsoft.com/office/drawing/2014/main" id="{E15167B9-B0DD-4928-91C4-ECD65665C021}"/>
+              </a:ext>
+            </a:extLst>
+          </p:cNvPr>
+          <p:cNvCxnSpPr>
+            <a:cxnSpLocks/>
+            <a:stCxn id="93" idx="3"/>
+            <a:endCxn id="68" idx="0"/>
+          </p:cNvCxnSpPr>
+          <p:nvPr/>
+        </p:nvCxnSpPr>
+        <p:spPr>
+          <a:xfrm flipH="1">
+            <a:off x="5405640" y="2000056"/>
+            <a:ext cx="646372" cy="1279155"/>
+          </a:xfrm>
+          <a:prstGeom prst="bentConnector4">
+            <a:avLst>
+              <a:gd name="adj1" fmla="val -35367"/>
+              <a:gd name="adj2" fmla="val 61165"/>
+            </a:avLst>
+          </a:prstGeom>
+          <a:ln>
+            <a:tailEnd type="triangle"/>
+          </a:ln>
+        </p:spPr>
+        <p:style>
+          <a:lnRef idx="1">
+            <a:schemeClr val="dk1"/>
+          </a:lnRef>
+          <a:fillRef idx="0">
+            <a:schemeClr val="dk1"/>
+          </a:fillRef>
+          <a:effectRef idx="0">
+            <a:schemeClr val="dk1"/>
+          </a:effectRef>
+          <a:fontRef idx="minor">
+            <a:schemeClr val="tx1"/>
+          </a:fontRef>
+        </p:style>
+      </p:cxnSp>
     </p:spTree>
     <p:extLst>
       <p:ext uri="{BB962C8B-B14F-4D97-AF65-F5344CB8AC3E}">

</xml_diff>